<commit_message>
day 2 metadata ppt
</commit_message>
<xml_diff>
--- a/Day_2/Day_2_Lectures/Day_2_Lecture_Metadata2.pptx
+++ b/Day_2/Day_2_Lectures/Day_2_Lecture_Metadata2.pptx
@@ -5,7 +5,7 @@
     <p:sldMasterId id="2147483648" r:id="rId1"/>
   </p:sldMasterIdLst>
   <p:notesMasterIdLst>
-    <p:notesMasterId r:id="rId28"/>
+    <p:notesMasterId r:id="rId31"/>
   </p:notesMasterIdLst>
   <p:sldIdLst>
     <p:sldId id="256" r:id="rId2"/>
@@ -14,26 +14,29 @@
     <p:sldId id="262" r:id="rId5"/>
     <p:sldId id="261" r:id="rId6"/>
     <p:sldId id="263" r:id="rId7"/>
-    <p:sldId id="265" r:id="rId8"/>
-    <p:sldId id="260" r:id="rId9"/>
-    <p:sldId id="269" r:id="rId10"/>
-    <p:sldId id="270" r:id="rId11"/>
-    <p:sldId id="273" r:id="rId12"/>
-    <p:sldId id="277" r:id="rId13"/>
-    <p:sldId id="275" r:id="rId14"/>
-    <p:sldId id="258" r:id="rId15"/>
-    <p:sldId id="259" r:id="rId16"/>
-    <p:sldId id="268" r:id="rId17"/>
-    <p:sldId id="271" r:id="rId18"/>
-    <p:sldId id="276" r:id="rId19"/>
-    <p:sldId id="281" r:id="rId20"/>
-    <p:sldId id="282" r:id="rId21"/>
+    <p:sldId id="289" r:id="rId8"/>
+    <p:sldId id="288" r:id="rId9"/>
+    <p:sldId id="290" r:id="rId10"/>
+    <p:sldId id="265" r:id="rId11"/>
+    <p:sldId id="275" r:id="rId12"/>
+    <p:sldId id="259" r:id="rId13"/>
+    <p:sldId id="268" r:id="rId14"/>
+    <p:sldId id="271" r:id="rId15"/>
+    <p:sldId id="276" r:id="rId16"/>
+    <p:sldId id="281" r:id="rId17"/>
+    <p:sldId id="292" r:id="rId18"/>
+    <p:sldId id="282" r:id="rId19"/>
+    <p:sldId id="291" r:id="rId20"/>
+    <p:sldId id="293" r:id="rId21"/>
     <p:sldId id="283" r:id="rId22"/>
     <p:sldId id="278" r:id="rId23"/>
     <p:sldId id="280" r:id="rId24"/>
-    <p:sldId id="279" r:id="rId25"/>
-    <p:sldId id="266" r:id="rId26"/>
-    <p:sldId id="274" r:id="rId27"/>
+    <p:sldId id="266" r:id="rId25"/>
+    <p:sldId id="279" r:id="rId26"/>
+    <p:sldId id="284" r:id="rId27"/>
+    <p:sldId id="274" r:id="rId28"/>
+    <p:sldId id="285" r:id="rId29"/>
+    <p:sldId id="286" r:id="rId30"/>
   </p:sldIdLst>
   <p:sldSz cx="9144000" cy="6858000" type="screen4x3"/>
   <p:notesSz cx="6858000" cy="9144000"/>
@@ -217,7 +220,7 @@
           <a:p>
             <a:fld id="{9A0E6E77-3283-344D-9AC2-FD5DD182305F}" type="datetimeFigureOut">
               <a:rPr lang="en-US" smtClean="0"/>
-              <a:t>1/18/15</a:t>
+              <a:t>1/19/15</a:t>
             </a:fld>
             <a:endParaRPr lang="en-US"/>
           </a:p>
@@ -634,7 +637,7 @@
           <a:p>
             <a:fld id="{036A4C59-9997-D64D-B418-4F4AB05D75FD}" type="slidenum">
               <a:rPr lang="en-US" smtClean="0"/>
-              <a:t>19</a:t>
+              <a:t>17</a:t>
             </a:fld>
             <a:endParaRPr lang="en-US"/>
           </a:p>
@@ -770,7 +773,7 @@
           <a:p>
             <a:fld id="{036A4C59-9997-D64D-B418-4F4AB05D75FD}" type="slidenum">
               <a:rPr lang="en-US" smtClean="0"/>
-              <a:t>20</a:t>
+              <a:t>18</a:t>
             </a:fld>
             <a:endParaRPr lang="en-US"/>
           </a:p>
@@ -835,13 +838,325 @@
           <a:p>
             <a:r>
               <a:rPr lang="en-US" dirty="0" smtClean="0"/>
-              <a:t>My </a:t>
-            </a:r>
-            <a:r>
-              <a:rPr lang="en-US" dirty="0" err="1" smtClean="0"/>
-              <a:t>poit</a:t>
+              <a:t>Note</a:t>
+            </a:r>
+            <a:r>
+              <a:rPr lang="en-US" baseline="0" dirty="0" smtClean="0"/>
+              <a:t> that these are equally flawed, too…</a:t>
+            </a:r>
+          </a:p>
+          <a:p>
+            <a:endParaRPr lang="en-US" baseline="0" dirty="0" smtClean="0"/>
+          </a:p>
+          <a:p>
+            <a:r>
+              <a:rPr lang="en-US" baseline="0" dirty="0" smtClean="0"/>
+              <a:t>Talk more about trade offs and affordances here</a:t>
+            </a:r>
+          </a:p>
+          <a:p>
+            <a:endParaRPr lang="en-US" baseline="0" dirty="0" smtClean="0"/>
+          </a:p>
+          <a:p>
+            <a:r>
+              <a:rPr lang="en-US" baseline="0" dirty="0" smtClean="0"/>
+              <a:t>GCMD is broader, RDA is more specific (narrower Designated community)</a:t>
+            </a:r>
+          </a:p>
+          <a:p>
+            <a:endParaRPr lang="en-US" baseline="0" dirty="0" smtClean="0"/>
+          </a:p>
+          <a:p>
+            <a:r>
+              <a:rPr lang="en-US" baseline="0" dirty="0" smtClean="0"/>
+              <a:t>Then show XML</a:t>
+            </a:r>
+          </a:p>
+          <a:p>
+            <a:endParaRPr lang="en-US" baseline="0" dirty="0" smtClean="0"/>
+          </a:p>
+          <a:p>
+            <a:r>
+              <a:rPr lang="en-US" baseline="0" dirty="0" smtClean="0"/>
+              <a:t>Decision of what </a:t>
+            </a:r>
+            <a:r>
+              <a:rPr lang="en-US" baseline="0" dirty="0" err="1" smtClean="0"/>
+              <a:t>attrinbute</a:t>
+            </a:r>
+            <a:r>
+              <a:rPr lang="en-US" baseline="0" dirty="0" smtClean="0"/>
+              <a:t> value pair to use has a real consequence</a:t>
             </a:r>
             <a:endParaRPr lang="en-US" dirty="0"/>
+          </a:p>
+        </p:txBody>
+      </p:sp>
+      <p:sp>
+        <p:nvSpPr>
+          <p:cNvPr id="4" name="Slide Number Placeholder 3"/>
+          <p:cNvSpPr>
+            <a:spLocks noGrp="1"/>
+          </p:cNvSpPr>
+          <p:nvPr>
+            <p:ph type="sldNum" sz="quarter" idx="10"/>
+          </p:nvPr>
+        </p:nvSpPr>
+        <p:spPr/>
+        <p:txBody>
+          <a:bodyPr/>
+          <a:lstStyle/>
+          <a:p>
+            <a:fld id="{036A4C59-9997-D64D-B418-4F4AB05D75FD}" type="slidenum">
+              <a:rPr lang="en-US" smtClean="0"/>
+              <a:t>19</a:t>
+            </a:fld>
+            <a:endParaRPr lang="en-US"/>
+          </a:p>
+        </p:txBody>
+      </p:sp>
+    </p:spTree>
+    <p:extLst>
+      <p:ext uri="{BB962C8B-B14F-4D97-AF65-F5344CB8AC3E}">
+        <p14:creationId xmlns:p14="http://schemas.microsoft.com/office/powerpoint/2010/main" val="4089888638"/>
+      </p:ext>
+    </p:extLst>
+  </p:cSld>
+  <p:clrMapOvr>
+    <a:masterClrMapping/>
+  </p:clrMapOvr>
+</p:notes>
+</file>
+
+<file path=ppt/notesSlides/notesSlide13.xml><?xml version="1.0" encoding="utf-8"?>
+<p:notes xmlns:a="http://schemas.openxmlformats.org/drawingml/2006/main" xmlns:r="http://schemas.openxmlformats.org/officeDocument/2006/relationships" xmlns:p="http://schemas.openxmlformats.org/presentationml/2006/main">
+  <p:cSld>
+    <p:spTree>
+      <p:nvGrpSpPr>
+        <p:cNvPr id="1" name=""/>
+        <p:cNvGrpSpPr/>
+        <p:nvPr/>
+      </p:nvGrpSpPr>
+      <p:grpSpPr>
+        <a:xfrm>
+          <a:off x="0" y="0"/>
+          <a:ext cx="0" cy="0"/>
+          <a:chOff x="0" y="0"/>
+          <a:chExt cx="0" cy="0"/>
+        </a:xfrm>
+      </p:grpSpPr>
+      <p:sp>
+        <p:nvSpPr>
+          <p:cNvPr id="2" name="Slide Image Placeholder 1"/>
+          <p:cNvSpPr>
+            <a:spLocks noGrp="1" noRot="1" noChangeAspect="1"/>
+          </p:cNvSpPr>
+          <p:nvPr>
+            <p:ph type="sldImg"/>
+          </p:nvPr>
+        </p:nvSpPr>
+        <p:spPr/>
+      </p:sp>
+      <p:sp>
+        <p:nvSpPr>
+          <p:cNvPr id="3" name="Notes Placeholder 2"/>
+          <p:cNvSpPr>
+            <a:spLocks noGrp="1"/>
+          </p:cNvSpPr>
+          <p:nvPr>
+            <p:ph type="body" idx="1"/>
+          </p:nvPr>
+        </p:nvSpPr>
+        <p:spPr/>
+        <p:txBody>
+          <a:bodyPr/>
+          <a:lstStyle/>
+          <a:p>
+            <a:r>
+              <a:rPr lang="en-US" dirty="0" smtClean="0"/>
+              <a:t>Note</a:t>
+            </a:r>
+            <a:r>
+              <a:rPr lang="en-US" baseline="0" dirty="0" smtClean="0"/>
+              <a:t> that these are equally flawed, too…</a:t>
+            </a:r>
+          </a:p>
+          <a:p>
+            <a:endParaRPr lang="en-US" baseline="0" dirty="0" smtClean="0"/>
+          </a:p>
+          <a:p>
+            <a:r>
+              <a:rPr lang="en-US" baseline="0" dirty="0" smtClean="0"/>
+              <a:t>Talk more about trade offs and affordances here</a:t>
+            </a:r>
+          </a:p>
+          <a:p>
+            <a:endParaRPr lang="en-US" baseline="0" dirty="0" smtClean="0"/>
+          </a:p>
+          <a:p>
+            <a:r>
+              <a:rPr lang="en-US" baseline="0" dirty="0" smtClean="0"/>
+              <a:t>GCMD is broader, RDA is more specific (narrower Designated community)</a:t>
+            </a:r>
+          </a:p>
+          <a:p>
+            <a:endParaRPr lang="en-US" baseline="0" dirty="0" smtClean="0"/>
+          </a:p>
+          <a:p>
+            <a:r>
+              <a:rPr lang="en-US" baseline="0" dirty="0" smtClean="0"/>
+              <a:t>Then show XML</a:t>
+            </a:r>
+          </a:p>
+          <a:p>
+            <a:endParaRPr lang="en-US" baseline="0" dirty="0" smtClean="0"/>
+          </a:p>
+          <a:p>
+            <a:r>
+              <a:rPr lang="en-US" baseline="0" dirty="0" smtClean="0"/>
+              <a:t>Decision of what </a:t>
+            </a:r>
+            <a:r>
+              <a:rPr lang="en-US" baseline="0" dirty="0" err="1" smtClean="0"/>
+              <a:t>attrinbute</a:t>
+            </a:r>
+            <a:r>
+              <a:rPr lang="en-US" baseline="0" dirty="0" smtClean="0"/>
+              <a:t> value pair to use has a real consequence</a:t>
+            </a:r>
+            <a:endParaRPr lang="en-US" dirty="0"/>
+          </a:p>
+        </p:txBody>
+      </p:sp>
+      <p:sp>
+        <p:nvSpPr>
+          <p:cNvPr id="4" name="Slide Number Placeholder 3"/>
+          <p:cNvSpPr>
+            <a:spLocks noGrp="1"/>
+          </p:cNvSpPr>
+          <p:nvPr>
+            <p:ph type="sldNum" sz="quarter" idx="10"/>
+          </p:nvPr>
+        </p:nvSpPr>
+        <p:spPr/>
+        <p:txBody>
+          <a:bodyPr/>
+          <a:lstStyle/>
+          <a:p>
+            <a:fld id="{036A4C59-9997-D64D-B418-4F4AB05D75FD}" type="slidenum">
+              <a:rPr lang="en-US" smtClean="0"/>
+              <a:t>20</a:t>
+            </a:fld>
+            <a:endParaRPr lang="en-US"/>
+          </a:p>
+        </p:txBody>
+      </p:sp>
+    </p:spTree>
+    <p:extLst>
+      <p:ext uri="{BB962C8B-B14F-4D97-AF65-F5344CB8AC3E}">
+        <p14:creationId xmlns:p14="http://schemas.microsoft.com/office/powerpoint/2010/main" val="4089888638"/>
+      </p:ext>
+    </p:extLst>
+  </p:cSld>
+  <p:clrMapOvr>
+    <a:masterClrMapping/>
+  </p:clrMapOvr>
+</p:notes>
+</file>
+
+<file path=ppt/notesSlides/notesSlide14.xml><?xml version="1.0" encoding="utf-8"?>
+<p:notes xmlns:a="http://schemas.openxmlformats.org/drawingml/2006/main" xmlns:r="http://schemas.openxmlformats.org/officeDocument/2006/relationships" xmlns:p="http://schemas.openxmlformats.org/presentationml/2006/main">
+  <p:cSld>
+    <p:spTree>
+      <p:nvGrpSpPr>
+        <p:cNvPr id="1" name=""/>
+        <p:cNvGrpSpPr/>
+        <p:nvPr/>
+      </p:nvGrpSpPr>
+      <p:grpSpPr>
+        <a:xfrm>
+          <a:off x="0" y="0"/>
+          <a:ext cx="0" cy="0"/>
+          <a:chOff x="0" y="0"/>
+          <a:chExt cx="0" cy="0"/>
+        </a:xfrm>
+      </p:grpSpPr>
+      <p:sp>
+        <p:nvSpPr>
+          <p:cNvPr id="2" name="Slide Image Placeholder 1"/>
+          <p:cNvSpPr>
+            <a:spLocks noGrp="1" noRot="1" noChangeAspect="1"/>
+          </p:cNvSpPr>
+          <p:nvPr>
+            <p:ph type="sldImg"/>
+          </p:nvPr>
+        </p:nvSpPr>
+        <p:spPr/>
+      </p:sp>
+      <p:sp>
+        <p:nvSpPr>
+          <p:cNvPr id="3" name="Notes Placeholder 2"/>
+          <p:cNvSpPr>
+            <a:spLocks noGrp="1"/>
+          </p:cNvSpPr>
+          <p:nvPr>
+            <p:ph type="body" idx="1"/>
+          </p:nvPr>
+        </p:nvSpPr>
+        <p:spPr/>
+        <p:txBody>
+          <a:bodyPr/>
+          <a:lstStyle/>
+          <a:p>
+            <a:r>
+              <a:rPr lang="en-US" dirty="0" smtClean="0"/>
+              <a:t>There</a:t>
+            </a:r>
+            <a:r>
+              <a:rPr lang="en-US" baseline="0" dirty="0" smtClean="0"/>
+              <a:t> have been efforts to ask similar questions of the schemas themselves</a:t>
+            </a:r>
+            <a:endParaRPr lang="en-US" dirty="0" smtClean="0"/>
+          </a:p>
+          <a:p>
+            <a:endParaRPr lang="en-US" dirty="0" smtClean="0"/>
+          </a:p>
+          <a:p>
+            <a:pPr marL="171450" indent="-171450">
+              <a:buFontTx/>
+              <a:buChar char="-"/>
+            </a:pPr>
+            <a:r>
+              <a:rPr lang="en-US" baseline="0" dirty="0" smtClean="0"/>
+              <a:t>Going to step through one example that’s out of the Research in DC world</a:t>
+            </a:r>
+          </a:p>
+          <a:p>
+            <a:pPr marL="171450" indent="-171450">
+              <a:buFontTx/>
+              <a:buChar char="-"/>
+            </a:pPr>
+            <a:r>
+              <a:rPr lang="en-US" baseline="0" dirty="0" smtClean="0"/>
+              <a:t>It is more complex than the last example but might still be useful. </a:t>
+            </a:r>
+          </a:p>
+          <a:p>
+            <a:pPr marL="171450" indent="-171450">
+              <a:buFontTx/>
+              <a:buChar char="-"/>
+            </a:pPr>
+            <a:endParaRPr lang="en-US" baseline="0" dirty="0" smtClean="0"/>
+          </a:p>
+          <a:p>
+            <a:pPr marL="171450" indent="-171450">
+              <a:buFontTx/>
+              <a:buChar char="-"/>
+            </a:pPr>
+            <a:r>
+              <a:rPr lang="en-US" dirty="0" smtClean="0"/>
+              <a:t>community, domain, function, and purpose</a:t>
+            </a:r>
           </a:p>
         </p:txBody>
       </p:sp>
@@ -872,6 +1187,198 @@
     <p:extLst>
       <p:ext uri="{BB962C8B-B14F-4D97-AF65-F5344CB8AC3E}">
         <p14:creationId xmlns:p14="http://schemas.microsoft.com/office/powerpoint/2010/main" val="3350389385"/>
+      </p:ext>
+    </p:extLst>
+  </p:cSld>
+  <p:clrMapOvr>
+    <a:masterClrMapping/>
+  </p:clrMapOvr>
+</p:notes>
+</file>
+
+<file path=ppt/notesSlides/notesSlide15.xml><?xml version="1.0" encoding="utf-8"?>
+<p:notes xmlns:a="http://schemas.openxmlformats.org/drawingml/2006/main" xmlns:r="http://schemas.openxmlformats.org/officeDocument/2006/relationships" xmlns:p="http://schemas.openxmlformats.org/presentationml/2006/main">
+  <p:cSld>
+    <p:spTree>
+      <p:nvGrpSpPr>
+        <p:cNvPr id="1" name=""/>
+        <p:cNvGrpSpPr/>
+        <p:nvPr/>
+      </p:nvGrpSpPr>
+      <p:grpSpPr>
+        <a:xfrm>
+          <a:off x="0" y="0"/>
+          <a:ext cx="0" cy="0"/>
+          <a:chOff x="0" y="0"/>
+          <a:chExt cx="0" cy="0"/>
+        </a:xfrm>
+      </p:grpSpPr>
+      <p:sp>
+        <p:nvSpPr>
+          <p:cNvPr id="2" name="Slide Image Placeholder 1"/>
+          <p:cNvSpPr>
+            <a:spLocks noGrp="1" noRot="1" noChangeAspect="1"/>
+          </p:cNvSpPr>
+          <p:nvPr>
+            <p:ph type="sldImg"/>
+          </p:nvPr>
+        </p:nvSpPr>
+        <p:spPr/>
+      </p:sp>
+      <p:sp>
+        <p:nvSpPr>
+          <p:cNvPr id="3" name="Notes Placeholder 2"/>
+          <p:cNvSpPr>
+            <a:spLocks noGrp="1"/>
+          </p:cNvSpPr>
+          <p:nvPr>
+            <p:ph type="body" idx="1"/>
+          </p:nvPr>
+        </p:nvSpPr>
+        <p:spPr/>
+        <p:txBody>
+          <a:bodyPr/>
+          <a:lstStyle/>
+          <a:p>
+            <a:r>
+              <a:rPr lang="en-US" dirty="0" smtClean="0"/>
+              <a:t>My </a:t>
+            </a:r>
+            <a:r>
+              <a:rPr lang="en-US" dirty="0" err="1" smtClean="0"/>
+              <a:t>poit</a:t>
+            </a:r>
+            <a:endParaRPr lang="en-US" dirty="0"/>
+          </a:p>
+        </p:txBody>
+      </p:sp>
+      <p:sp>
+        <p:nvSpPr>
+          <p:cNvPr id="4" name="Slide Number Placeholder 3"/>
+          <p:cNvSpPr>
+            <a:spLocks noGrp="1"/>
+          </p:cNvSpPr>
+          <p:nvPr>
+            <p:ph type="sldNum" sz="quarter" idx="10"/>
+          </p:nvPr>
+        </p:nvSpPr>
+        <p:spPr/>
+        <p:txBody>
+          <a:bodyPr/>
+          <a:lstStyle/>
+          <a:p>
+            <a:fld id="{036A4C59-9997-D64D-B418-4F4AB05D75FD}" type="slidenum">
+              <a:rPr lang="en-US" smtClean="0"/>
+              <a:t>27</a:t>
+            </a:fld>
+            <a:endParaRPr lang="en-US"/>
+          </a:p>
+        </p:txBody>
+      </p:sp>
+    </p:spTree>
+    <p:extLst>
+      <p:ext uri="{BB962C8B-B14F-4D97-AF65-F5344CB8AC3E}">
+        <p14:creationId xmlns:p14="http://schemas.microsoft.com/office/powerpoint/2010/main" val="3350389385"/>
+      </p:ext>
+    </p:extLst>
+  </p:cSld>
+  <p:clrMapOvr>
+    <a:masterClrMapping/>
+  </p:clrMapOvr>
+</p:notes>
+</file>
+
+<file path=ppt/notesSlides/notesSlide16.xml><?xml version="1.0" encoding="utf-8"?>
+<p:notes xmlns:a="http://schemas.openxmlformats.org/drawingml/2006/main" xmlns:r="http://schemas.openxmlformats.org/officeDocument/2006/relationships" xmlns:p="http://schemas.openxmlformats.org/presentationml/2006/main">
+  <p:cSld>
+    <p:spTree>
+      <p:nvGrpSpPr>
+        <p:cNvPr id="1" name=""/>
+        <p:cNvGrpSpPr/>
+        <p:nvPr/>
+      </p:nvGrpSpPr>
+      <p:grpSpPr>
+        <a:xfrm>
+          <a:off x="0" y="0"/>
+          <a:ext cx="0" cy="0"/>
+          <a:chOff x="0" y="0"/>
+          <a:chExt cx="0" cy="0"/>
+        </a:xfrm>
+      </p:grpSpPr>
+      <p:sp>
+        <p:nvSpPr>
+          <p:cNvPr id="2" name="Slide Image Placeholder 1"/>
+          <p:cNvSpPr>
+            <a:spLocks noGrp="1" noRot="1" noChangeAspect="1"/>
+          </p:cNvSpPr>
+          <p:nvPr>
+            <p:ph type="sldImg"/>
+          </p:nvPr>
+        </p:nvSpPr>
+        <p:spPr/>
+      </p:sp>
+      <p:sp>
+        <p:nvSpPr>
+          <p:cNvPr id="3" name="Notes Placeholder 2"/>
+          <p:cNvSpPr>
+            <a:spLocks noGrp="1"/>
+          </p:cNvSpPr>
+          <p:nvPr>
+            <p:ph type="body" idx="1"/>
+          </p:nvPr>
+        </p:nvSpPr>
+        <p:spPr/>
+        <p:txBody>
+          <a:bodyPr/>
+          <a:lstStyle/>
+          <a:p>
+            <a:r>
+              <a:rPr lang="en-US" dirty="0" smtClean="0"/>
+              <a:t>Note</a:t>
+            </a:r>
+            <a:r>
+              <a:rPr lang="en-US" baseline="0" dirty="0" smtClean="0"/>
+              <a:t> that these categories are similar to </a:t>
+            </a:r>
+            <a:r>
+              <a:rPr lang="en-US" baseline="0" dirty="0" err="1" smtClean="0"/>
+              <a:t>descrptive</a:t>
+            </a:r>
+            <a:r>
+              <a:rPr lang="en-US" baseline="0" dirty="0" smtClean="0"/>
+              <a:t>, technical </a:t>
+            </a:r>
+            <a:endParaRPr lang="en-US" dirty="0"/>
+          </a:p>
+        </p:txBody>
+      </p:sp>
+      <p:sp>
+        <p:nvSpPr>
+          <p:cNvPr id="4" name="Slide Number Placeholder 3"/>
+          <p:cNvSpPr>
+            <a:spLocks noGrp="1"/>
+          </p:cNvSpPr>
+          <p:nvPr>
+            <p:ph type="sldNum" sz="quarter" idx="10"/>
+          </p:nvPr>
+        </p:nvSpPr>
+        <p:spPr/>
+        <p:txBody>
+          <a:bodyPr/>
+          <a:lstStyle/>
+          <a:p>
+            <a:fld id="{036A4C59-9997-D64D-B418-4F4AB05D75FD}" type="slidenum">
+              <a:rPr lang="en-US" smtClean="0"/>
+              <a:t>28</a:t>
+            </a:fld>
+            <a:endParaRPr lang="en-US"/>
+          </a:p>
+        </p:txBody>
+      </p:sp>
+    </p:spTree>
+    <p:extLst>
+      <p:ext uri="{BB962C8B-B14F-4D97-AF65-F5344CB8AC3E}">
+        <p14:creationId xmlns:p14="http://schemas.microsoft.com/office/powerpoint/2010/main" val="3091892597"/>
       </p:ext>
     </p:extLst>
   </p:cSld>
@@ -1034,40 +1541,11 @@
           <a:p>
             <a:r>
               <a:rPr lang="en-US" dirty="0" smtClean="0"/>
-              <a:t>With these requirements in mind</a:t>
+              <a:t>After understanding strengths priorities and constraints of</a:t>
             </a:r>
             <a:r>
               <a:rPr lang="en-US" baseline="0" dirty="0" smtClean="0"/>
-              <a:t>, you can return to resources like “Seeing Standards” or </a:t>
-            </a:r>
-          </a:p>
-          <a:p>
-            <a:r>
-              <a:rPr lang="en-US" baseline="0" dirty="0" smtClean="0"/>
-              <a:t>http://</a:t>
-            </a:r>
-            <a:r>
-              <a:rPr lang="en-US" baseline="0" dirty="0" err="1" smtClean="0"/>
-              <a:t>www.dcc.ac.uk</a:t>
-            </a:r>
-            <a:r>
-              <a:rPr lang="en-US" baseline="0" dirty="0" smtClean="0"/>
-              <a:t>/resources/metadata-standards </a:t>
-            </a:r>
-          </a:p>
-          <a:p>
-            <a:r>
-              <a:rPr lang="en-US" baseline="0" dirty="0" smtClean="0"/>
-              <a:t>and begin the process of choosing a metadata schema.  </a:t>
-            </a:r>
-          </a:p>
-          <a:p>
-            <a:endParaRPr lang="en-US" baseline="0" dirty="0" smtClean="0"/>
-          </a:p>
-          <a:p>
-            <a:r>
-              <a:rPr lang="en-US" baseline="0" dirty="0" smtClean="0"/>
-              <a:t>Unfortunately, while the 9 questions do help you determine the scope of your collections and needs, they don’t provide you with a mechanism to point you to a schema</a:t>
+              <a:t> your repository</a:t>
             </a:r>
             <a:endParaRPr lang="en-US" dirty="0"/>
           </a:p>
@@ -1090,7 +1568,7 @@
           <a:p>
             <a:fld id="{036A4C59-9997-D64D-B418-4F4AB05D75FD}" type="slidenum">
               <a:rPr lang="en-US" smtClean="0"/>
-              <a:t>7</a:t>
+              <a:t>8</a:t>
             </a:fld>
             <a:endParaRPr lang="en-US"/>
           </a:p>
@@ -1099,7 +1577,7 @@
     </p:spTree>
     <p:extLst>
       <p:ext uri="{BB962C8B-B14F-4D97-AF65-F5344CB8AC3E}">
-        <p14:creationId xmlns:p14="http://schemas.microsoft.com/office/powerpoint/2010/main" val="1844635102"/>
+        <p14:creationId xmlns:p14="http://schemas.microsoft.com/office/powerpoint/2010/main" val="2765581035"/>
       </p:ext>
     </p:extLst>
   </p:cSld>
@@ -1153,55 +1631,7 @@
           <a:bodyPr/>
           <a:lstStyle/>
           <a:p>
-            <a:r>
-              <a:rPr lang="en-US" dirty="0" smtClean="0"/>
-              <a:t>There</a:t>
-            </a:r>
-            <a:r>
-              <a:rPr lang="en-US" baseline="0" dirty="0" smtClean="0"/>
-              <a:t> have been efforts to ask similar questions of the schemas themselves</a:t>
-            </a:r>
-            <a:endParaRPr lang="en-US" dirty="0" smtClean="0"/>
-          </a:p>
-          <a:p>
-            <a:endParaRPr lang="en-US" dirty="0" smtClean="0"/>
-          </a:p>
-          <a:p>
-            <a:pPr marL="171450" indent="-171450">
-              <a:buFontTx/>
-              <a:buChar char="-"/>
-            </a:pPr>
-            <a:r>
-              <a:rPr lang="en-US" baseline="0" dirty="0" smtClean="0"/>
-              <a:t>Going to step through one example that’s out of the Research in DC world</a:t>
-            </a:r>
-          </a:p>
-          <a:p>
-            <a:pPr marL="171450" indent="-171450">
-              <a:buFontTx/>
-              <a:buChar char="-"/>
-            </a:pPr>
-            <a:r>
-              <a:rPr lang="en-US" baseline="0" dirty="0" smtClean="0"/>
-              <a:t>It is more complex than the last example but might still be useful. </a:t>
-            </a:r>
-          </a:p>
-          <a:p>
-            <a:pPr marL="171450" indent="-171450">
-              <a:buFontTx/>
-              <a:buChar char="-"/>
-            </a:pPr>
-            <a:endParaRPr lang="en-US" baseline="0" dirty="0" smtClean="0"/>
-          </a:p>
-          <a:p>
-            <a:pPr marL="171450" indent="-171450">
-              <a:buFontTx/>
-              <a:buChar char="-"/>
-            </a:pPr>
-            <a:r>
-              <a:rPr lang="en-US" dirty="0" smtClean="0"/>
-              <a:t>community, domain, function, and purpose</a:t>
-            </a:r>
+            <a:endParaRPr lang="en-US" dirty="0"/>
           </a:p>
         </p:txBody>
       </p:sp>
@@ -1222,7 +1652,7 @@
           <a:p>
             <a:fld id="{036A4C59-9997-D64D-B418-4F4AB05D75FD}" type="slidenum">
               <a:rPr lang="en-US" smtClean="0"/>
-              <a:t>8</a:t>
+              <a:t>9</a:t>
             </a:fld>
             <a:endParaRPr lang="en-US"/>
           </a:p>
@@ -1231,7 +1661,7 @@
     </p:spTree>
     <p:extLst>
       <p:ext uri="{BB962C8B-B14F-4D97-AF65-F5344CB8AC3E}">
-        <p14:creationId xmlns:p14="http://schemas.microsoft.com/office/powerpoint/2010/main" val="3350389385"/>
+        <p14:creationId xmlns:p14="http://schemas.microsoft.com/office/powerpoint/2010/main" val="2067169483"/>
       </p:ext>
     </p:extLst>
   </p:cSld>
@@ -1287,19 +1717,40 @@
           <a:p>
             <a:r>
               <a:rPr lang="en-US" dirty="0" smtClean="0"/>
-              <a:t>Note</a:t>
+              <a:t>With these requirements in mind</a:t>
             </a:r>
             <a:r>
               <a:rPr lang="en-US" baseline="0" dirty="0" smtClean="0"/>
-              <a:t> that these categories are similar to </a:t>
+              <a:t>, you can return to resources like “Seeing Standards” or </a:t>
+            </a:r>
+          </a:p>
+          <a:p>
+            <a:r>
+              <a:rPr lang="en-US" baseline="0" dirty="0" smtClean="0"/>
+              <a:t>http://</a:t>
             </a:r>
             <a:r>
               <a:rPr lang="en-US" baseline="0" dirty="0" err="1" smtClean="0"/>
-              <a:t>descrptive</a:t>
+              <a:t>www.dcc.ac.uk</a:t>
             </a:r>
             <a:r>
               <a:rPr lang="en-US" baseline="0" dirty="0" smtClean="0"/>
-              <a:t>, technical </a:t>
+              <a:t>/resources/metadata-standards </a:t>
+            </a:r>
+          </a:p>
+          <a:p>
+            <a:r>
+              <a:rPr lang="en-US" baseline="0" dirty="0" smtClean="0"/>
+              <a:t>and begin the process of choosing a metadata schema.  </a:t>
+            </a:r>
+          </a:p>
+          <a:p>
+            <a:endParaRPr lang="en-US" baseline="0" dirty="0" smtClean="0"/>
+          </a:p>
+          <a:p>
+            <a:r>
+              <a:rPr lang="en-US" baseline="0" dirty="0" smtClean="0"/>
+              <a:t>Unfortunately, while the 9 questions do help you determine the scope of your collections and needs, they don’t provide you with a mechanism to point you to a schema</a:t>
             </a:r>
             <a:endParaRPr lang="en-US" dirty="0"/>
           </a:p>
@@ -1322,7 +1773,7 @@
           <a:p>
             <a:fld id="{036A4C59-9997-D64D-B418-4F4AB05D75FD}" type="slidenum">
               <a:rPr lang="en-US" smtClean="0"/>
-              <a:t>9</a:t>
+              <a:t>10</a:t>
             </a:fld>
             <a:endParaRPr lang="en-US"/>
           </a:p>
@@ -1331,7 +1782,7 @@
     </p:spTree>
     <p:extLst>
       <p:ext uri="{BB962C8B-B14F-4D97-AF65-F5344CB8AC3E}">
-        <p14:creationId xmlns:p14="http://schemas.microsoft.com/office/powerpoint/2010/main" val="3091892597"/>
+        <p14:creationId xmlns:p14="http://schemas.microsoft.com/office/powerpoint/2010/main" val="1844635102"/>
       </p:ext>
     </p:extLst>
   </p:cSld>
@@ -1387,7 +1838,11 @@
           <a:p>
             <a:r>
               <a:rPr lang="en-US" dirty="0" smtClean="0"/>
-              <a:t>Come back to this slide</a:t>
+              <a:t>Note</a:t>
+            </a:r>
+            <a:r>
+              <a:rPr lang="en-US" baseline="0" dirty="0" smtClean="0"/>
+              <a:t> that these are equally flawed, too…</a:t>
             </a:r>
             <a:endParaRPr lang="en-US" dirty="0"/>
           </a:p>
@@ -1419,7 +1874,7 @@
     </p:spTree>
     <p:extLst>
       <p:ext uri="{BB962C8B-B14F-4D97-AF65-F5344CB8AC3E}">
-        <p14:creationId xmlns:p14="http://schemas.microsoft.com/office/powerpoint/2010/main" val="2078914979"/>
+        <p14:creationId xmlns:p14="http://schemas.microsoft.com/office/powerpoint/2010/main" val="4089888638"/>
       </p:ext>
     </p:extLst>
   </p:cSld>
@@ -1473,15 +1928,7 @@
           <a:bodyPr/>
           <a:lstStyle/>
           <a:p>
-            <a:r>
-              <a:rPr lang="en-US" dirty="0" smtClean="0"/>
-              <a:t>Note</a:t>
-            </a:r>
-            <a:r>
-              <a:rPr lang="en-US" baseline="0" dirty="0" smtClean="0"/>
-              <a:t> that these are equally flawed, too…</a:t>
-            </a:r>
-            <a:endParaRPr lang="en-US" dirty="0"/>
+            <a:endParaRPr lang="en-US" baseline="0" dirty="0" smtClean="0"/>
           </a:p>
         </p:txBody>
       </p:sp>
@@ -1511,7 +1958,7 @@
     </p:spTree>
     <p:extLst>
       <p:ext uri="{BB962C8B-B14F-4D97-AF65-F5344CB8AC3E}">
-        <p14:creationId xmlns:p14="http://schemas.microsoft.com/office/powerpoint/2010/main" val="4089888638"/>
+        <p14:creationId xmlns:p14="http://schemas.microsoft.com/office/powerpoint/2010/main" val="2547542338"/>
       </p:ext>
     </p:extLst>
   </p:cSld>
@@ -1566,12 +2013,16 @@
           <a:lstStyle/>
           <a:p>
             <a:r>
-              <a:rPr lang="en-US" dirty="0" smtClean="0"/>
-              <a:t>Delete</a:t>
+              <a:rPr lang="en-US" smtClean="0"/>
+              <a:t>Those tensions</a:t>
+            </a:r>
+            <a:r>
+              <a:rPr lang="en-US" baseline="0" smtClean="0"/>
+              <a:t>– </a:t>
             </a:r>
             <a:r>
               <a:rPr lang="en-US" baseline="0" dirty="0" smtClean="0"/>
-              <a:t> probably</a:t>
+              <a:t>mean that </a:t>
             </a:r>
             <a:endParaRPr lang="en-US" dirty="0"/>
           </a:p>
@@ -1594,7 +2045,7 @@
           <a:p>
             <a:fld id="{036A4C59-9997-D64D-B418-4F4AB05D75FD}" type="slidenum">
               <a:rPr lang="en-US" smtClean="0"/>
-              <a:t>14</a:t>
+              <a:t>15</a:t>
             </a:fld>
             <a:endParaRPr lang="en-US"/>
           </a:p>
@@ -1603,7 +2054,7 @@
     </p:spTree>
     <p:extLst>
       <p:ext uri="{BB962C8B-B14F-4D97-AF65-F5344CB8AC3E}">
-        <p14:creationId xmlns:p14="http://schemas.microsoft.com/office/powerpoint/2010/main" val="3541738306"/>
+        <p14:creationId xmlns:p14="http://schemas.microsoft.com/office/powerpoint/2010/main" val="460468296"/>
       </p:ext>
     </p:extLst>
   </p:cSld>
@@ -1657,7 +2108,7 @@
           <a:bodyPr/>
           <a:lstStyle/>
           <a:p>
-            <a:endParaRPr lang="en-US" baseline="0" dirty="0" smtClean="0"/>
+            <a:endParaRPr lang="en-US" dirty="0"/>
           </a:p>
         </p:txBody>
       </p:sp>
@@ -1687,7 +2138,7 @@
     </p:spTree>
     <p:extLst>
       <p:ext uri="{BB962C8B-B14F-4D97-AF65-F5344CB8AC3E}">
-        <p14:creationId xmlns:p14="http://schemas.microsoft.com/office/powerpoint/2010/main" val="2547542338"/>
+        <p14:creationId xmlns:p14="http://schemas.microsoft.com/office/powerpoint/2010/main" val="4089888638"/>
       </p:ext>
     </p:extLst>
   </p:cSld>
@@ -1878,7 +2329,7 @@
           <a:p>
             <a:fld id="{9D6228D5-5F93-BB4A-964B-203967C46295}" type="datetimeFigureOut">
               <a:rPr lang="en-US" smtClean="0"/>
-              <a:t>1/18/15</a:t>
+              <a:t>1/19/15</a:t>
             </a:fld>
             <a:endParaRPr lang="en-US"/>
           </a:p>
@@ -2048,7 +2499,7 @@
           <a:p>
             <a:fld id="{9D6228D5-5F93-BB4A-964B-203967C46295}" type="datetimeFigureOut">
               <a:rPr lang="en-US" smtClean="0"/>
-              <a:t>1/18/15</a:t>
+              <a:t>1/19/15</a:t>
             </a:fld>
             <a:endParaRPr lang="en-US"/>
           </a:p>
@@ -2228,7 +2679,7 @@
           <a:p>
             <a:fld id="{9D6228D5-5F93-BB4A-964B-203967C46295}" type="datetimeFigureOut">
               <a:rPr lang="en-US" smtClean="0"/>
-              <a:t>1/18/15</a:t>
+              <a:t>1/19/15</a:t>
             </a:fld>
             <a:endParaRPr lang="en-US"/>
           </a:p>
@@ -2398,7 +2849,7 @@
           <a:p>
             <a:fld id="{9D6228D5-5F93-BB4A-964B-203967C46295}" type="datetimeFigureOut">
               <a:rPr lang="en-US" smtClean="0"/>
-              <a:t>1/18/15</a:t>
+              <a:t>1/19/15</a:t>
             </a:fld>
             <a:endParaRPr lang="en-US"/>
           </a:p>
@@ -2644,7 +3095,7 @@
           <a:p>
             <a:fld id="{9D6228D5-5F93-BB4A-964B-203967C46295}" type="datetimeFigureOut">
               <a:rPr lang="en-US" smtClean="0"/>
-              <a:t>1/18/15</a:t>
+              <a:t>1/19/15</a:t>
             </a:fld>
             <a:endParaRPr lang="en-US"/>
           </a:p>
@@ -2932,7 +3383,7 @@
           <a:p>
             <a:fld id="{9D6228D5-5F93-BB4A-964B-203967C46295}" type="datetimeFigureOut">
               <a:rPr lang="en-US" smtClean="0"/>
-              <a:t>1/18/15</a:t>
+              <a:t>1/19/15</a:t>
             </a:fld>
             <a:endParaRPr lang="en-US"/>
           </a:p>
@@ -3354,7 +3805,7 @@
           <a:p>
             <a:fld id="{9D6228D5-5F93-BB4A-964B-203967C46295}" type="datetimeFigureOut">
               <a:rPr lang="en-US" smtClean="0"/>
-              <a:t>1/18/15</a:t>
+              <a:t>1/19/15</a:t>
             </a:fld>
             <a:endParaRPr lang="en-US"/>
           </a:p>
@@ -3472,7 +3923,7 @@
           <a:p>
             <a:fld id="{9D6228D5-5F93-BB4A-964B-203967C46295}" type="datetimeFigureOut">
               <a:rPr lang="en-US" smtClean="0"/>
-              <a:t>1/18/15</a:t>
+              <a:t>1/19/15</a:t>
             </a:fld>
             <a:endParaRPr lang="en-US"/>
           </a:p>
@@ -3567,7 +4018,7 @@
           <a:p>
             <a:fld id="{9D6228D5-5F93-BB4A-964B-203967C46295}" type="datetimeFigureOut">
               <a:rPr lang="en-US" smtClean="0"/>
-              <a:t>1/18/15</a:t>
+              <a:t>1/19/15</a:t>
             </a:fld>
             <a:endParaRPr lang="en-US"/>
           </a:p>
@@ -3844,7 +4295,7 @@
           <a:p>
             <a:fld id="{9D6228D5-5F93-BB4A-964B-203967C46295}" type="datetimeFigureOut">
               <a:rPr lang="en-US" smtClean="0"/>
-              <a:t>1/18/15</a:t>
+              <a:t>1/19/15</a:t>
             </a:fld>
             <a:endParaRPr lang="en-US"/>
           </a:p>
@@ -4097,7 +4548,7 @@
           <a:p>
             <a:fld id="{9D6228D5-5F93-BB4A-964B-203967C46295}" type="datetimeFigureOut">
               <a:rPr lang="en-US" smtClean="0"/>
-              <a:t>1/18/15</a:t>
+              <a:t>1/19/15</a:t>
             </a:fld>
             <a:endParaRPr lang="en-US"/>
           </a:p>
@@ -4310,7 +4761,7 @@
           <a:p>
             <a:fld id="{9D6228D5-5F93-BB4A-964B-203967C46295}" type="datetimeFigureOut">
               <a:rPr lang="en-US" smtClean="0"/>
-              <a:t>1/18/15</a:t>
+              <a:t>1/19/15</a:t>
             </a:fld>
             <a:endParaRPr lang="en-US"/>
           </a:p>
@@ -4829,7 +5280,11 @@
           <a:p>
             <a:r>
               <a:rPr lang="en-US" dirty="0" smtClean="0"/>
-              <a:t>MODAL applied</a:t>
+              <a:t>THEN Evaluate </a:t>
+            </a:r>
+            <a:r>
+              <a:rPr lang="en-US" dirty="0" smtClean="0"/>
+              <a:t>Schemas</a:t>
             </a:r>
             <a:endParaRPr lang="en-US" dirty="0"/>
           </a:p>
@@ -4850,246 +5305,64 @@
           <a:bodyPr/>
           <a:lstStyle/>
           <a:p>
-            <a:pPr marL="0" indent="0">
+            <a:pPr marL="457200" lvl="1" indent="0">
               <a:buNone/>
             </a:pPr>
-            <a:r>
-              <a:rPr lang="en-US" dirty="0" smtClean="0"/>
-              <a:t>Research questions:</a:t>
-            </a:r>
-          </a:p>
-          <a:p>
-            <a:pPr marL="914400" lvl="1" indent="-514350">
-              <a:buFont typeface="+mj-lt"/>
-              <a:buAutoNum type="arabicPeriod"/>
-            </a:pPr>
-            <a:r>
-              <a:rPr lang="en-US" dirty="0" smtClean="0"/>
-              <a:t>What </a:t>
-            </a:r>
-            <a:r>
-              <a:rPr lang="en-US" dirty="0"/>
-              <a:t>is the scope of scientific metadata schemes? </a:t>
-            </a:r>
-            <a:endParaRPr lang="en-US" dirty="0" smtClean="0"/>
-          </a:p>
-          <a:p>
-            <a:pPr marL="914400" lvl="1" indent="-514350">
-              <a:buFont typeface="+mj-lt"/>
-              <a:buAutoNum type="arabicPeriod"/>
-            </a:pPr>
-            <a:r>
-              <a:rPr lang="en-US" dirty="0" smtClean="0"/>
-              <a:t>What </a:t>
-            </a:r>
-            <a:r>
-              <a:rPr lang="en-US" dirty="0"/>
-              <a:t>are the similarities and differences between </a:t>
-            </a:r>
-            <a:r>
-              <a:rPr lang="en-US" dirty="0" smtClean="0"/>
-              <a:t>scientific </a:t>
-            </a:r>
-            <a:r>
-              <a:rPr lang="en-US" dirty="0"/>
-              <a:t>metadata schemes</a:t>
-            </a:r>
-            <a:r>
-              <a:rPr lang="en-US" dirty="0" smtClean="0"/>
-              <a:t>?</a:t>
-            </a:r>
-          </a:p>
-          <a:p>
-            <a:pPr marL="914400" lvl="1" indent="-514350">
-              <a:buFont typeface="+mj-lt"/>
-              <a:buAutoNum type="arabicPeriod"/>
-            </a:pPr>
-            <a:r>
-              <a:rPr lang="en-US" dirty="0" smtClean="0"/>
-              <a:t>What </a:t>
-            </a:r>
-            <a:r>
-              <a:rPr lang="en-US" dirty="0"/>
-              <a:t>may be the fundamental requirements of metadata schemes for scientific data</a:t>
-            </a:r>
-            <a:r>
-              <a:rPr lang="en-US" dirty="0" smtClean="0"/>
-              <a:t>?</a:t>
-            </a:r>
             <a:endParaRPr lang="en-US" dirty="0"/>
           </a:p>
         </p:txBody>
       </p:sp>
+      <p:pic>
+        <p:nvPicPr>
+          <p:cNvPr id="4" name="Picture 3" descr="seeingstandards.pdf"/>
+          <p:cNvPicPr>
+            <a:picLocks noChangeAspect="1"/>
+          </p:cNvPicPr>
+          <p:nvPr/>
+        </p:nvPicPr>
+        <p:blipFill>
+          <a:blip r:embed="rId3">
+            <a:extLst>
+              <a:ext uri="{28A0092B-C50C-407E-A947-70E740481C1C}">
+                <a14:useLocalDpi xmlns:a14="http://schemas.microsoft.com/office/drawing/2010/main" val="0"/>
+              </a:ext>
+            </a:extLst>
+          </a:blip>
+          <a:stretch>
+            <a:fillRect/>
+          </a:stretch>
+        </p:blipFill>
+        <p:spPr>
+          <a:xfrm>
+            <a:off x="0" y="2416198"/>
+            <a:ext cx="9144000" cy="3048000"/>
+          </a:xfrm>
+          <a:prstGeom prst="rect">
+            <a:avLst/>
+          </a:prstGeom>
+        </p:spPr>
+      </p:pic>
     </p:spTree>
     <p:extLst>
       <p:ext uri="{BB962C8B-B14F-4D97-AF65-F5344CB8AC3E}">
-        <p14:creationId xmlns:p14="http://schemas.microsoft.com/office/powerpoint/2010/main" val="2744696797"/>
+        <p14:creationId xmlns:p14="http://schemas.microsoft.com/office/powerpoint/2010/main" val="1228390011"/>
       </p:ext>
     </p:extLst>
   </p:cSld>
   <p:clrMapOvr>
     <a:masterClrMapping/>
   </p:clrMapOvr>
+  <p:timing>
+    <p:tnLst>
+      <p:par>
+        <p:cTn xmlns:p14="http://schemas.microsoft.com/office/powerpoint/2010/main" id="1" dur="indefinite" restart="never" nodeType="tmRoot"/>
+      </p:par>
+    </p:tnLst>
+  </p:timing>
 </p:sld>
 </file>
 
 <file path=ppt/slides/slide11.xml><?xml version="1.0" encoding="utf-8"?>
-<p:sld xmlns:a="http://schemas.openxmlformats.org/drawingml/2006/main" xmlns:r="http://schemas.openxmlformats.org/officeDocument/2006/relationships" xmlns:p="http://schemas.openxmlformats.org/presentationml/2006/main">
-  <p:cSld>
-    <p:spTree>
-      <p:nvGrpSpPr>
-        <p:cNvPr id="1" name=""/>
-        <p:cNvGrpSpPr/>
-        <p:nvPr/>
-      </p:nvGrpSpPr>
-      <p:grpSpPr>
-        <a:xfrm>
-          <a:off x="0" y="0"/>
-          <a:ext cx="0" cy="0"/>
-          <a:chOff x="0" y="0"/>
-          <a:chExt cx="0" cy="0"/>
-        </a:xfrm>
-      </p:grpSpPr>
-      <p:sp>
-        <p:nvSpPr>
-          <p:cNvPr id="2" name="Title 1"/>
-          <p:cNvSpPr>
-            <a:spLocks noGrp="1"/>
-          </p:cNvSpPr>
-          <p:nvPr>
-            <p:ph type="title"/>
-          </p:nvPr>
-        </p:nvSpPr>
-        <p:spPr/>
-        <p:txBody>
-          <a:bodyPr/>
-          <a:lstStyle/>
-          <a:p>
-            <a:r>
-              <a:rPr lang="en-US" dirty="0" smtClean="0"/>
-              <a:t>Application to Practice</a:t>
-            </a:r>
-            <a:endParaRPr lang="en-US" dirty="0"/>
-          </a:p>
-        </p:txBody>
-      </p:sp>
-      <p:sp>
-        <p:nvSpPr>
-          <p:cNvPr id="3" name="Content Placeholder 2"/>
-          <p:cNvSpPr>
-            <a:spLocks noGrp="1"/>
-          </p:cNvSpPr>
-          <p:nvPr>
-            <p:ph idx="1"/>
-          </p:nvPr>
-        </p:nvSpPr>
-        <p:spPr/>
-        <p:txBody>
-          <a:bodyPr/>
-          <a:lstStyle/>
-          <a:p>
-            <a:r>
-              <a:rPr lang="en-US" dirty="0" smtClean="0"/>
-              <a:t>MODAL is a more robust way of analyzing schemas? </a:t>
-            </a:r>
-          </a:p>
-          <a:p>
-            <a:r>
-              <a:rPr lang="en-US" dirty="0" smtClean="0"/>
-              <a:t>That said, it’s not a magic bullet (because there is no magic bullet)</a:t>
-            </a:r>
-            <a:endParaRPr lang="en-US" dirty="0"/>
-          </a:p>
-        </p:txBody>
-      </p:sp>
-    </p:spTree>
-    <p:extLst>
-      <p:ext uri="{BB962C8B-B14F-4D97-AF65-F5344CB8AC3E}">
-        <p14:creationId xmlns:p14="http://schemas.microsoft.com/office/powerpoint/2010/main" val="912285991"/>
-      </p:ext>
-    </p:extLst>
-  </p:cSld>
-  <p:clrMapOvr>
-    <a:masterClrMapping/>
-  </p:clrMapOvr>
-</p:sld>
-</file>
-
-<file path=ppt/slides/slide12.xml><?xml version="1.0" encoding="utf-8"?>
-<p:sld xmlns:a="http://schemas.openxmlformats.org/drawingml/2006/main" xmlns:r="http://schemas.openxmlformats.org/officeDocument/2006/relationships" xmlns:p="http://schemas.openxmlformats.org/presentationml/2006/main">
-  <p:cSld>
-    <p:spTree>
-      <p:nvGrpSpPr>
-        <p:cNvPr id="1" name=""/>
-        <p:cNvGrpSpPr/>
-        <p:nvPr/>
-      </p:nvGrpSpPr>
-      <p:grpSpPr>
-        <a:xfrm>
-          <a:off x="0" y="0"/>
-          <a:ext cx="0" cy="0"/>
-          <a:chOff x="0" y="0"/>
-          <a:chExt cx="0" cy="0"/>
-        </a:xfrm>
-      </p:grpSpPr>
-      <p:sp>
-        <p:nvSpPr>
-          <p:cNvPr id="2" name="Title 1"/>
-          <p:cNvSpPr>
-            <a:spLocks noGrp="1"/>
-          </p:cNvSpPr>
-          <p:nvPr>
-            <p:ph type="title"/>
-          </p:nvPr>
-        </p:nvSpPr>
-        <p:spPr/>
-        <p:txBody>
-          <a:bodyPr>
-            <a:normAutofit fontScale="90000"/>
-          </a:bodyPr>
-          <a:lstStyle/>
-          <a:p>
-            <a:r>
-              <a:rPr lang="en-US" dirty="0" smtClean="0"/>
-              <a:t>Need to find some more resources on ACTUALLY PICKING SOMETHING</a:t>
-            </a:r>
-            <a:endParaRPr lang="en-US" dirty="0"/>
-          </a:p>
-        </p:txBody>
-      </p:sp>
-      <p:sp>
-        <p:nvSpPr>
-          <p:cNvPr id="3" name="Content Placeholder 2"/>
-          <p:cNvSpPr>
-            <a:spLocks noGrp="1"/>
-          </p:cNvSpPr>
-          <p:nvPr>
-            <p:ph idx="1"/>
-          </p:nvPr>
-        </p:nvSpPr>
-        <p:spPr/>
-        <p:txBody>
-          <a:bodyPr/>
-          <a:lstStyle/>
-          <a:p>
-            <a:endParaRPr lang="en-US"/>
-          </a:p>
-        </p:txBody>
-      </p:sp>
-    </p:spTree>
-    <p:extLst>
-      <p:ext uri="{BB962C8B-B14F-4D97-AF65-F5344CB8AC3E}">
-        <p14:creationId xmlns:p14="http://schemas.microsoft.com/office/powerpoint/2010/main" val="3278632672"/>
-      </p:ext>
-    </p:extLst>
-  </p:cSld>
-  <p:clrMapOvr>
-    <a:masterClrMapping/>
-  </p:clrMapOvr>
-</p:sld>
-</file>
-
-<file path=ppt/slides/slide13.xml><?xml version="1.0" encoding="utf-8"?>
 <p:sld xmlns:a="http://schemas.openxmlformats.org/drawingml/2006/main" xmlns:r="http://schemas.openxmlformats.org/officeDocument/2006/relationships" xmlns:p="http://schemas.openxmlformats.org/presentationml/2006/main">
   <p:cSld>
     <p:spTree>
@@ -5462,7 +5735,7 @@
 </p:sld>
 </file>
 
-<file path=ppt/slides/slide14.xml><?xml version="1.0" encoding="utf-8"?>
+<file path=ppt/slides/slide12.xml><?xml version="1.0" encoding="utf-8"?>
 <p:sld xmlns:a="http://schemas.openxmlformats.org/drawingml/2006/main" xmlns:r="http://schemas.openxmlformats.org/officeDocument/2006/relationships" xmlns:p="http://schemas.openxmlformats.org/presentationml/2006/main">
   <p:cSld>
     <p:spTree>
@@ -5497,120 +5770,10 @@
           <a:lstStyle/>
           <a:p>
             <a:r>
-              <a:rPr lang="en-US" dirty="0" smtClean="0"/>
-              <a:t>Avoid the </a:t>
-            </a:r>
-            <a:r>
-              <a:rPr lang="en-US" dirty="0" smtClean="0"/>
-              <a:t>Goldilocks </a:t>
-            </a:r>
-            <a:r>
-              <a:rPr lang="en-US" dirty="0" smtClean="0"/>
-              <a:t>problem</a:t>
-            </a:r>
-            <a:endParaRPr lang="en-US" dirty="0"/>
-          </a:p>
-        </p:txBody>
-      </p:sp>
-      <p:sp>
-        <p:nvSpPr>
-          <p:cNvPr id="3" name="Content Placeholder 2"/>
-          <p:cNvSpPr>
-            <a:spLocks noGrp="1"/>
-          </p:cNvSpPr>
-          <p:nvPr>
-            <p:ph idx="1"/>
-          </p:nvPr>
-        </p:nvSpPr>
-        <p:spPr/>
-        <p:txBody>
-          <a:bodyPr>
-            <a:normAutofit/>
-          </a:bodyPr>
-          <a:lstStyle/>
-          <a:p>
-            <a:r>
               <a:rPr lang="en-US" sz="3000" dirty="0" smtClean="0"/>
-              <a:t>Dublin Core is too sparse but MARC is too verbose!</a:t>
-            </a:r>
-          </a:p>
-          <a:p>
-            <a:endParaRPr lang="en-US" sz="3000" dirty="0" smtClean="0"/>
-          </a:p>
-          <a:p>
-            <a:r>
-              <a:rPr lang="en-US" sz="3000" dirty="0" smtClean="0"/>
-              <a:t>CDWA is too complicated but VRA Core doesn’t describe all my data!</a:t>
-            </a:r>
-          </a:p>
-          <a:p>
-            <a:endParaRPr lang="en-US" sz="3000" dirty="0" smtClean="0"/>
-          </a:p>
-          <a:p>
-            <a:r>
-              <a:rPr lang="en-US" sz="3000" dirty="0" err="1" smtClean="0"/>
-              <a:t>DarwinCore</a:t>
-            </a:r>
-            <a:r>
-              <a:rPr lang="en-US" sz="3000" dirty="0" smtClean="0"/>
-              <a:t> looks like it will work, but it doesn’t have a DTD!</a:t>
+              <a:t>Standards (and your ability to implement them) will always have limitations</a:t>
             </a:r>
             <a:endParaRPr lang="en-US" sz="3000" dirty="0"/>
-          </a:p>
-        </p:txBody>
-      </p:sp>
-    </p:spTree>
-    <p:extLst>
-      <p:ext uri="{BB962C8B-B14F-4D97-AF65-F5344CB8AC3E}">
-        <p14:creationId xmlns:p14="http://schemas.microsoft.com/office/powerpoint/2010/main" val="1062428975"/>
-      </p:ext>
-    </p:extLst>
-  </p:cSld>
-  <p:clrMapOvr>
-    <a:masterClrMapping/>
-  </p:clrMapOvr>
-</p:sld>
-</file>
-
-<file path=ppt/slides/slide15.xml><?xml version="1.0" encoding="utf-8"?>
-<p:sld xmlns:a="http://schemas.openxmlformats.org/drawingml/2006/main" xmlns:r="http://schemas.openxmlformats.org/officeDocument/2006/relationships" xmlns:p="http://schemas.openxmlformats.org/presentationml/2006/main">
-  <p:cSld>
-    <p:spTree>
-      <p:nvGrpSpPr>
-        <p:cNvPr id="1" name=""/>
-        <p:cNvGrpSpPr/>
-        <p:nvPr/>
-      </p:nvGrpSpPr>
-      <p:grpSpPr>
-        <a:xfrm>
-          <a:off x="0" y="0"/>
-          <a:ext cx="0" cy="0"/>
-          <a:chOff x="0" y="0"/>
-          <a:chExt cx="0" cy="0"/>
-        </a:xfrm>
-      </p:grpSpPr>
-      <p:sp>
-        <p:nvSpPr>
-          <p:cNvPr id="2" name="Title 1"/>
-          <p:cNvSpPr>
-            <a:spLocks noGrp="1"/>
-          </p:cNvSpPr>
-          <p:nvPr>
-            <p:ph type="title"/>
-          </p:nvPr>
-        </p:nvSpPr>
-        <p:spPr/>
-        <p:txBody>
-          <a:bodyPr>
-            <a:normAutofit fontScale="90000"/>
-          </a:bodyPr>
-          <a:lstStyle/>
-          <a:p>
-            <a:r>
-              <a:rPr lang="en-US" dirty="0" smtClean="0"/>
-              <a:t>Step 3: Understand that “good enough” is better than instead of “just right”</a:t>
-            </a:r>
-            <a:endParaRPr lang="en-US" dirty="0"/>
           </a:p>
         </p:txBody>
       </p:sp>
@@ -5651,15 +5814,6 @@
               <a:buNone/>
             </a:pPr>
             <a:endParaRPr lang="en-US" dirty="0"/>
-          </a:p>
-          <a:p>
-            <a:pPr marL="0" indent="0" algn="ctr">
-              <a:buNone/>
-            </a:pPr>
-            <a:r>
-              <a:rPr lang="en-US" dirty="0"/>
-              <a:t>Standards will always have limitations</a:t>
-            </a:r>
           </a:p>
           <a:p>
             <a:pPr marL="0" indent="0" algn="ctr">
@@ -5677,7 +5831,7 @@
         </p:nvCxnSpPr>
         <p:spPr>
           <a:xfrm>
-            <a:off x="2963477" y="2734378"/>
+            <a:off x="2698730" y="3636211"/>
             <a:ext cx="3475028" cy="0"/>
           </a:xfrm>
           <a:prstGeom prst="straightConnector1">
@@ -5711,8 +5865,8 @@
         </p:nvSpPr>
         <p:spPr>
           <a:xfrm>
-            <a:off x="862914" y="2411212"/>
-            <a:ext cx="1659569" cy="646331"/>
+            <a:off x="881322" y="3313045"/>
+            <a:ext cx="1659569" cy="369332"/>
           </a:xfrm>
           <a:prstGeom prst="rect">
             <a:avLst/>
@@ -5729,9 +5883,7 @@
               <a:rPr lang="en-US" dirty="0" smtClean="0"/>
               <a:t>Expressivity</a:t>
             </a:r>
-          </a:p>
-          <a:p>
-            <a:endParaRPr lang="en-US" dirty="0"/>
+            <a:endParaRPr lang="en-US" dirty="0" smtClean="0"/>
           </a:p>
         </p:txBody>
       </p:sp>
@@ -5743,8 +5895,8 @@
         </p:nvSpPr>
         <p:spPr>
           <a:xfrm>
-            <a:off x="6571832" y="2411212"/>
-            <a:ext cx="1659569" cy="646331"/>
+            <a:off x="6590240" y="3313259"/>
+            <a:ext cx="1659569" cy="369332"/>
           </a:xfrm>
           <a:prstGeom prst="rect">
             <a:avLst/>
@@ -5758,8 +5910,77 @@
           <a:lstStyle/>
           <a:p>
             <a:r>
-              <a:rPr lang="en-US" dirty="0" err="1" smtClean="0"/>
-              <a:t>Interoperablity</a:t>
+              <a:rPr lang="en-US" dirty="0" smtClean="0"/>
+              <a:t>Interoperability</a:t>
+            </a:r>
+            <a:endParaRPr lang="en-US" dirty="0" smtClean="0"/>
+          </a:p>
+        </p:txBody>
+      </p:sp>
+      <p:sp>
+        <p:nvSpPr>
+          <p:cNvPr id="10" name="TextBox 9"/>
+          <p:cNvSpPr txBox="1"/>
+          <p:nvPr/>
+        </p:nvSpPr>
+        <p:spPr>
+          <a:xfrm>
+            <a:off x="6329180" y="3862809"/>
+            <a:ext cx="2357620" cy="646331"/>
+          </a:xfrm>
+          <a:prstGeom prst="rect">
+            <a:avLst/>
+          </a:prstGeom>
+          <a:noFill/>
+        </p:spPr>
+        <p:txBody>
+          <a:bodyPr wrap="square" rtlCol="0">
+            <a:spAutoFit/>
+          </a:bodyPr>
+          <a:lstStyle/>
+          <a:p>
+            <a:pPr algn="ctr"/>
+            <a:r>
+              <a:rPr lang="en-US" dirty="0" smtClean="0"/>
+              <a:t>Community needs</a:t>
+            </a:r>
+            <a:endParaRPr lang="en-US" dirty="0" smtClean="0"/>
+          </a:p>
+          <a:p>
+            <a:endParaRPr lang="en-US" dirty="0"/>
+          </a:p>
+        </p:txBody>
+      </p:sp>
+      <p:sp>
+        <p:nvSpPr>
+          <p:cNvPr id="11" name="TextBox 10"/>
+          <p:cNvSpPr txBox="1"/>
+          <p:nvPr/>
+        </p:nvSpPr>
+        <p:spPr>
+          <a:xfrm>
+            <a:off x="457200" y="3862800"/>
+            <a:ext cx="2357620" cy="646331"/>
+          </a:xfrm>
+          <a:prstGeom prst="rect">
+            <a:avLst/>
+          </a:prstGeom>
+          <a:noFill/>
+        </p:spPr>
+        <p:txBody>
+          <a:bodyPr wrap="square" rtlCol="0">
+            <a:spAutoFit/>
+          </a:bodyPr>
+          <a:lstStyle/>
+          <a:p>
+            <a:pPr algn="ctr"/>
+            <a:r>
+              <a:rPr lang="en-US" dirty="0" smtClean="0"/>
+              <a:t>Loca</a:t>
+            </a:r>
+            <a:r>
+              <a:rPr lang="en-US" dirty="0" smtClean="0"/>
+              <a:t>l needs</a:t>
             </a:r>
             <a:endParaRPr lang="en-US" dirty="0" smtClean="0"/>
           </a:p>
@@ -5781,7 +6002,7 @@
 </p:sld>
 </file>
 
-<file path=ppt/slides/slide16.xml><?xml version="1.0" encoding="utf-8"?>
+<file path=ppt/slides/slide13.xml><?xml version="1.0" encoding="utf-8"?>
 <p:sld xmlns:a="http://schemas.openxmlformats.org/drawingml/2006/main" xmlns:r="http://schemas.openxmlformats.org/officeDocument/2006/relationships" xmlns:p="http://schemas.openxmlformats.org/presentationml/2006/main">
   <p:cSld>
     <p:spTree>
@@ -5901,7 +6122,7 @@
 </p:sld>
 </file>
 
-<file path=ppt/slides/slide17.xml><?xml version="1.0" encoding="utf-8"?>
+<file path=ppt/slides/slide14.xml><?xml version="1.0" encoding="utf-8"?>
 <p:sld xmlns:a="http://schemas.openxmlformats.org/drawingml/2006/main" xmlns:r="http://schemas.openxmlformats.org/officeDocument/2006/relationships" xmlns:p="http://schemas.openxmlformats.org/presentationml/2006/main">
   <p:cSld>
     <p:spTree>
@@ -5942,11 +6163,7 @@
           <a:p>
             <a:r>
               <a:rPr lang="en-US" b="1" dirty="0" smtClean="0"/>
-              <a:t>Metadata </a:t>
-            </a:r>
-            <a:r>
-              <a:rPr lang="en-US" b="1" dirty="0" smtClean="0"/>
-              <a:t>III: </a:t>
+              <a:t>Metadata III: </a:t>
             </a:r>
             <a:r>
               <a:rPr lang="en-US" b="1" dirty="0" err="1" smtClean="0"/>
@@ -6010,7 +6227,7 @@
 </p:sld>
 </file>
 
-<file path=ppt/slides/slide18.xml><?xml version="1.0" encoding="utf-8"?>
+<file path=ppt/slides/slide15.xml><?xml version="1.0" encoding="utf-8"?>
 <p:sld xmlns:a="http://schemas.openxmlformats.org/drawingml/2006/main" xmlns:r="http://schemas.openxmlformats.org/officeDocument/2006/relationships" xmlns:p="http://schemas.openxmlformats.org/presentationml/2006/main">
   <p:cSld>
     <p:spTree>
@@ -6059,7 +6276,7 @@
           <p:nvPr/>
         </p:nvPicPr>
         <p:blipFill>
-          <a:blip r:embed="rId2">
+          <a:blip r:embed="rId3">
             <a:extLst>
               <a:ext uri="{28A0092B-C50C-407E-A947-70E740481C1C}">
                 <a14:useLocalDpi xmlns:a14="http://schemas.microsoft.com/office/drawing/2010/main" val="0"/>
@@ -6100,7 +6317,7 @@
 </p:sld>
 </file>
 
-<file path=ppt/slides/slide19.xml><?xml version="1.0" encoding="utf-8"?>
+<file path=ppt/slides/slide16.xml><?xml version="1.0" encoding="utf-8"?>
 <p:sld xmlns:a="http://schemas.openxmlformats.org/drawingml/2006/main" xmlns:r="http://schemas.openxmlformats.org/officeDocument/2006/relationships" xmlns:p="http://schemas.openxmlformats.org/presentationml/2006/main">
   <p:cSld>
     <p:spTree>
@@ -6513,7 +6730,7 @@
 </p:sld>
 </file>
 
-<file path=ppt/slides/slide2.xml><?xml version="1.0" encoding="utf-8"?>
+<file path=ppt/slides/slide17.xml><?xml version="1.0" encoding="utf-8"?>
 <p:sld xmlns:a="http://schemas.openxmlformats.org/drawingml/2006/main" xmlns:r="http://schemas.openxmlformats.org/officeDocument/2006/relationships" xmlns:p="http://schemas.openxmlformats.org/presentationml/2006/main">
   <p:cSld>
     <p:spTree>
@@ -6530,141 +6747,136 @@
           <a:chExt cx="0" cy="0"/>
         </a:xfrm>
       </p:grpSpPr>
-      <p:pic>
-        <p:nvPicPr>
-          <p:cNvPr id="2" name="Picture 1" descr="seeingstandards.pdf"/>
-          <p:cNvPicPr>
-            <a:picLocks noChangeAspect="1"/>
-          </p:cNvPicPr>
-          <p:nvPr/>
-        </p:nvPicPr>
-        <p:blipFill>
-          <a:blip r:embed="rId2">
-            <a:extLst>
-              <a:ext uri="{28A0092B-C50C-407E-A947-70E740481C1C}">
-                <a14:useLocalDpi xmlns:a14="http://schemas.microsoft.com/office/drawing/2010/main" val="0"/>
-              </a:ext>
-            </a:extLst>
-          </a:blip>
-          <a:stretch>
-            <a:fillRect/>
-          </a:stretch>
-        </p:blipFill>
+      <p:sp>
+        <p:nvSpPr>
+          <p:cNvPr id="2" name="Title 1"/>
+          <p:cNvSpPr>
+            <a:spLocks noGrp="1"/>
+          </p:cNvSpPr>
+          <p:nvPr>
+            <p:ph type="title"/>
+          </p:nvPr>
+        </p:nvSpPr>
+        <p:spPr/>
+        <p:txBody>
+          <a:bodyPr>
+            <a:normAutofit/>
+          </a:bodyPr>
+          <a:lstStyle/>
+          <a:p>
+            <a:r>
+              <a:rPr lang="en-US" dirty="0" smtClean="0"/>
+              <a:t>Consider the following</a:t>
+            </a:r>
+            <a:endParaRPr lang="en-US" dirty="0"/>
+          </a:p>
+        </p:txBody>
+      </p:sp>
+      <p:sp>
+        <p:nvSpPr>
+          <p:cNvPr id="3" name="Content Placeholder 2"/>
+          <p:cNvSpPr>
+            <a:spLocks noGrp="1"/>
+          </p:cNvSpPr>
+          <p:nvPr>
+            <p:ph idx="1"/>
+          </p:nvPr>
+        </p:nvSpPr>
         <p:spPr>
           <a:xfrm>
-            <a:off x="0" y="2103271"/>
-            <a:ext cx="9144000" cy="3048000"/>
+            <a:off x="457199" y="1600200"/>
+            <a:ext cx="7974597" cy="1398797"/>
           </a:xfrm>
-          <a:prstGeom prst="rect">
-            <a:avLst/>
-          </a:prstGeom>
-        </p:spPr>
-      </p:pic>
-      <p:sp>
-        <p:nvSpPr>
-          <p:cNvPr id="3" name="Title 1"/>
-          <p:cNvSpPr txBox="1">
-            <a:spLocks/>
-          </p:cNvSpPr>
-          <p:nvPr/>
-        </p:nvSpPr>
-        <p:spPr>
-          <a:xfrm>
-            <a:off x="457200" y="274638"/>
-            <a:ext cx="8229600" cy="1143000"/>
-          </a:xfrm>
-          <a:prstGeom prst="rect">
-            <a:avLst/>
-          </a:prstGeom>
+          <a:ln>
+            <a:solidFill>
+              <a:srgbClr val="000000"/>
+            </a:solidFill>
+          </a:ln>
         </p:spPr>
         <p:txBody>
           <a:bodyPr>
             <a:noAutofit/>
           </a:bodyPr>
-          <a:lstStyle>
-            <a:lvl1pPr algn="ctr" defTabSz="457200" rtl="0" eaLnBrk="1" latinLnBrk="0" hangingPunct="1">
-              <a:spcBef>
-                <a:spcPct val="0"/>
-              </a:spcBef>
+          <a:lstStyle/>
+          <a:p>
+            <a:pPr marL="0" indent="0">
               <a:buNone/>
-              <a:defRPr sz="4400" kern="1200">
-                <a:solidFill>
-                  <a:schemeClr val="tx1"/>
-                </a:solidFill>
-                <a:latin typeface="+mj-lt"/>
-                <a:ea typeface="+mj-ea"/>
-                <a:cs typeface="+mj-cs"/>
-              </a:defRPr>
-            </a:lvl1pPr>
-          </a:lstStyle>
-          <a:p>
-            <a:r>
-              <a:rPr lang="en-US" sz="3600" dirty="0" smtClean="0"/>
-              <a:t>There are a LOT of different metadata schemas…</a:t>
-            </a:r>
-            <a:endParaRPr lang="en-US" sz="3600" i="1" dirty="0"/>
-          </a:p>
-        </p:txBody>
-      </p:sp>
-    </p:spTree>
-    <p:extLst>
-      <p:ext uri="{BB962C8B-B14F-4D97-AF65-F5344CB8AC3E}">
-        <p14:creationId xmlns:p14="http://schemas.microsoft.com/office/powerpoint/2010/main" val="298525638"/>
-      </p:ext>
-    </p:extLst>
-  </p:cSld>
-  <p:clrMapOvr>
-    <a:masterClrMapping/>
-  </p:clrMapOvr>
-  <p:timing>
-    <p:tnLst>
-      <p:par>
-        <p:cTn xmlns:p14="http://schemas.microsoft.com/office/powerpoint/2010/main" id="1" dur="indefinite" restart="never" nodeType="tmRoot"/>
-      </p:par>
-    </p:tnLst>
-  </p:timing>
-</p:sld>
-</file>
-
-<file path=ppt/slides/slide20.xml><?xml version="1.0" encoding="utf-8"?>
-<p:sld xmlns:a="http://schemas.openxmlformats.org/drawingml/2006/main" xmlns:r="http://schemas.openxmlformats.org/officeDocument/2006/relationships" xmlns:p="http://schemas.openxmlformats.org/presentationml/2006/main">
-  <p:cSld>
-    <p:spTree>
-      <p:nvGrpSpPr>
-        <p:cNvPr id="1" name=""/>
-        <p:cNvGrpSpPr/>
-        <p:nvPr/>
-      </p:nvGrpSpPr>
-      <p:grpSpPr>
-        <a:xfrm>
-          <a:off x="0" y="0"/>
-          <a:ext cx="0" cy="0"/>
-          <a:chOff x="0" y="0"/>
-          <a:chExt cx="0" cy="0"/>
-        </a:xfrm>
-      </p:grpSpPr>
-      <p:sp>
-        <p:nvSpPr>
-          <p:cNvPr id="2" name="Title 1"/>
-          <p:cNvSpPr>
-            <a:spLocks noGrp="1"/>
-          </p:cNvSpPr>
-          <p:nvPr>
-            <p:ph type="title"/>
-          </p:nvPr>
-        </p:nvSpPr>
-        <p:spPr/>
-        <p:txBody>
-          <a:bodyPr>
-            <a:normAutofit/>
-          </a:bodyPr>
-          <a:lstStyle/>
-          <a:p>
-            <a:r>
-              <a:rPr lang="en-US" dirty="0" smtClean="0"/>
-              <a:t>Consider the following</a:t>
-            </a:r>
-            <a:endParaRPr lang="en-US" dirty="0"/>
+            </a:pPr>
+            <a:r>
+              <a:rPr lang="en-US" sz="2400" dirty="0"/>
+              <a:t>100	a	Shakespeare, William   d   1564-</a:t>
+            </a:r>
+            <a:r>
+              <a:rPr lang="en-US" sz="2400" dirty="0" smtClean="0"/>
+              <a:t>1616</a:t>
+            </a:r>
+          </a:p>
+          <a:p>
+            <a:pPr marL="0" indent="0">
+              <a:buNone/>
+            </a:pPr>
+            <a:r>
+              <a:rPr lang="en-US" sz="2400" dirty="0" smtClean="0"/>
+              <a:t>245</a:t>
+            </a:r>
+            <a:r>
+              <a:rPr lang="en-US" sz="2400" dirty="0"/>
+              <a:t>	</a:t>
+            </a:r>
+            <a:r>
+              <a:rPr lang="en-US" sz="2400" dirty="0" smtClean="0"/>
+              <a:t>a</a:t>
+            </a:r>
+            <a:r>
+              <a:rPr lang="en-US" sz="2400" dirty="0"/>
+              <a:t>	</a:t>
+            </a:r>
+            <a:r>
+              <a:rPr lang="en-US" sz="2400" dirty="0" smtClean="0"/>
+              <a:t>The Tempest</a:t>
+            </a:r>
+            <a:r>
+              <a:rPr lang="en-US" sz="2400" dirty="0"/>
+              <a:t>	      </a:t>
+            </a:r>
+            <a:endParaRPr lang="en-US" sz="2400" dirty="0" smtClean="0"/>
+          </a:p>
+          <a:p>
+            <a:pPr marL="0" indent="0">
+              <a:buNone/>
+            </a:pPr>
+            <a:r>
+              <a:rPr lang="en-US" sz="2400" dirty="0" smtClean="0"/>
+              <a:t>260</a:t>
+            </a:r>
+            <a:r>
+              <a:rPr lang="en-US" sz="2400" dirty="0"/>
+              <a:t>	a	</a:t>
+            </a:r>
+            <a:r>
+              <a:rPr lang="en-US" sz="2400" dirty="0" smtClean="0"/>
+              <a:t>London: </a:t>
+            </a:r>
+            <a:r>
+              <a:rPr lang="en-US" sz="2400" dirty="0"/>
+              <a:t>b  </a:t>
+            </a:r>
+            <a:r>
+              <a:rPr lang="en-US" sz="2400" dirty="0" smtClean="0"/>
+              <a:t>Arden Shakespeare,   </a:t>
+            </a:r>
+            <a:r>
+              <a:rPr lang="en-US" sz="2400" dirty="0"/>
+              <a:t>c </a:t>
+            </a:r>
+            <a:r>
+              <a:rPr lang="en-US" sz="2400" dirty="0" smtClean="0"/>
+              <a:t>1999</a:t>
+            </a:r>
+            <a:r>
+              <a:rPr lang="en-US" sz="2400" dirty="0"/>
+              <a:t>	     </a:t>
+            </a:r>
           </a:p>
         </p:txBody>
       </p:sp>
@@ -6835,6 +7047,311 @@
           </a:p>
         </p:txBody>
       </p:sp>
+      <p:sp>
+        <p:nvSpPr>
+          <p:cNvPr id="7" name="Rectangle 6"/>
+          <p:cNvSpPr/>
+          <p:nvPr/>
+        </p:nvSpPr>
+        <p:spPr>
+          <a:xfrm>
+            <a:off x="457199" y="3752166"/>
+            <a:ext cx="8229601" cy="1569660"/>
+          </a:xfrm>
+          <a:prstGeom prst="rect">
+            <a:avLst/>
+          </a:prstGeom>
+          <a:ln>
+            <a:solidFill>
+              <a:srgbClr val="000000"/>
+            </a:solidFill>
+          </a:ln>
+        </p:spPr>
+        <p:txBody>
+          <a:bodyPr wrap="square">
+            <a:spAutoFit/>
+          </a:bodyPr>
+          <a:lstStyle/>
+          <a:p>
+            <a:r>
+              <a:rPr lang="en-US" sz="2400" dirty="0" smtClean="0"/>
+              <a:t>&lt;</a:t>
+            </a:r>
+            <a:r>
+              <a:rPr lang="en-US" sz="2400" dirty="0" err="1"/>
+              <a:t>dc:creator</a:t>
+            </a:r>
+            <a:r>
+              <a:rPr lang="en-US" sz="2400" dirty="0"/>
+              <a:t>&gt;Shakespeare, William, 1564-1616&lt;/&gt;</a:t>
+            </a:r>
+          </a:p>
+          <a:p>
+            <a:r>
+              <a:rPr lang="en-US" sz="2400" dirty="0" smtClean="0"/>
+              <a:t>&lt;</a:t>
+            </a:r>
+            <a:r>
+              <a:rPr lang="en-US" sz="2400" dirty="0" err="1"/>
+              <a:t>dc:title</a:t>
+            </a:r>
+            <a:r>
+              <a:rPr lang="en-US" sz="2400" dirty="0"/>
+              <a:t>&gt;Hamlet&lt;/&gt;</a:t>
+            </a:r>
+          </a:p>
+          <a:p>
+            <a:r>
+              <a:rPr lang="en-US" sz="2400" dirty="0" smtClean="0"/>
+              <a:t>&lt;</a:t>
+            </a:r>
+            <a:r>
+              <a:rPr lang="en-US" sz="2400" dirty="0" err="1"/>
+              <a:t>dc:publisher</a:t>
+            </a:r>
+            <a:r>
+              <a:rPr lang="en-US" sz="2400" dirty="0"/>
+              <a:t>&gt;Penguin Books&lt;/&gt;</a:t>
+            </a:r>
+          </a:p>
+          <a:p>
+            <a:r>
+              <a:rPr lang="en-US" sz="2400" dirty="0" smtClean="0"/>
+              <a:t>&lt;</a:t>
+            </a:r>
+            <a:r>
+              <a:rPr lang="en-US" sz="2400" dirty="0" err="1"/>
+              <a:t>dc:date</a:t>
+            </a:r>
+            <a:r>
+              <a:rPr lang="en-US" sz="2400" dirty="0"/>
+              <a:t>&gt;2003&lt;/&gt;</a:t>
+            </a:r>
+          </a:p>
+        </p:txBody>
+      </p:sp>
+    </p:spTree>
+    <p:extLst>
+      <p:ext uri="{BB962C8B-B14F-4D97-AF65-F5344CB8AC3E}">
+        <p14:creationId xmlns:p14="http://schemas.microsoft.com/office/powerpoint/2010/main" val="2725698964"/>
+      </p:ext>
+    </p:extLst>
+  </p:cSld>
+  <p:clrMapOvr>
+    <a:masterClrMapping/>
+  </p:clrMapOvr>
+</p:sld>
+</file>
+
+<file path=ppt/slides/slide18.xml><?xml version="1.0" encoding="utf-8"?>
+<p:sld xmlns:a="http://schemas.openxmlformats.org/drawingml/2006/main" xmlns:r="http://schemas.openxmlformats.org/officeDocument/2006/relationships" xmlns:p="http://schemas.openxmlformats.org/presentationml/2006/main">
+  <p:cSld>
+    <p:spTree>
+      <p:nvGrpSpPr>
+        <p:cNvPr id="1" name=""/>
+        <p:cNvGrpSpPr/>
+        <p:nvPr/>
+      </p:nvGrpSpPr>
+      <p:grpSpPr>
+        <a:xfrm>
+          <a:off x="0" y="0"/>
+          <a:ext cx="0" cy="0"/>
+          <a:chOff x="0" y="0"/>
+          <a:chExt cx="0" cy="0"/>
+        </a:xfrm>
+      </p:grpSpPr>
+      <p:sp>
+        <p:nvSpPr>
+          <p:cNvPr id="2" name="Title 1"/>
+          <p:cNvSpPr>
+            <a:spLocks noGrp="1"/>
+          </p:cNvSpPr>
+          <p:nvPr>
+            <p:ph type="title"/>
+          </p:nvPr>
+        </p:nvSpPr>
+        <p:spPr/>
+        <p:txBody>
+          <a:bodyPr>
+            <a:normAutofit/>
+          </a:bodyPr>
+          <a:lstStyle/>
+          <a:p>
+            <a:r>
+              <a:rPr lang="en-US" dirty="0" smtClean="0"/>
+              <a:t>Consider the following</a:t>
+            </a:r>
+            <a:endParaRPr lang="en-US" dirty="0"/>
+          </a:p>
+        </p:txBody>
+      </p:sp>
+      <p:sp>
+        <p:nvSpPr>
+          <p:cNvPr id="6" name="Content Placeholder 2"/>
+          <p:cNvSpPr txBox="1">
+            <a:spLocks/>
+          </p:cNvSpPr>
+          <p:nvPr/>
+        </p:nvSpPr>
+        <p:spPr>
+          <a:xfrm>
+            <a:off x="609599" y="3499075"/>
+            <a:ext cx="4129133" cy="851921"/>
+          </a:xfrm>
+          <a:prstGeom prst="rect">
+            <a:avLst/>
+          </a:prstGeom>
+        </p:spPr>
+        <p:txBody>
+          <a:bodyPr vert="horz" lIns="91440" tIns="45720" rIns="91440" bIns="45720" rtlCol="0">
+            <a:normAutofit/>
+          </a:bodyPr>
+          <a:lstStyle>
+            <a:lvl1pPr marL="342900" indent="-342900" algn="l" defTabSz="457200" rtl="0" eaLnBrk="1" latinLnBrk="0" hangingPunct="1">
+              <a:spcBef>
+                <a:spcPct val="20000"/>
+              </a:spcBef>
+              <a:buFont typeface="Arial"/>
+              <a:buChar char="•"/>
+              <a:defRPr sz="3200" kern="1200">
+                <a:solidFill>
+                  <a:schemeClr val="tx1"/>
+                </a:solidFill>
+                <a:latin typeface="+mn-lt"/>
+                <a:ea typeface="+mn-ea"/>
+                <a:cs typeface="+mn-cs"/>
+              </a:defRPr>
+            </a:lvl1pPr>
+            <a:lvl2pPr marL="742950" indent="-285750" algn="l" defTabSz="457200" rtl="0" eaLnBrk="1" latinLnBrk="0" hangingPunct="1">
+              <a:spcBef>
+                <a:spcPct val="20000"/>
+              </a:spcBef>
+              <a:buFont typeface="Arial"/>
+              <a:buChar char="–"/>
+              <a:defRPr sz="2800" kern="1200">
+                <a:solidFill>
+                  <a:schemeClr val="tx1"/>
+                </a:solidFill>
+                <a:latin typeface="+mn-lt"/>
+                <a:ea typeface="+mn-ea"/>
+                <a:cs typeface="+mn-cs"/>
+              </a:defRPr>
+            </a:lvl2pPr>
+            <a:lvl3pPr marL="1143000" indent="-228600" algn="l" defTabSz="457200" rtl="0" eaLnBrk="1" latinLnBrk="0" hangingPunct="1">
+              <a:spcBef>
+                <a:spcPct val="20000"/>
+              </a:spcBef>
+              <a:buFont typeface="Arial"/>
+              <a:buChar char="•"/>
+              <a:defRPr sz="2400" kern="1200">
+                <a:solidFill>
+                  <a:schemeClr val="tx1"/>
+                </a:solidFill>
+                <a:latin typeface="+mn-lt"/>
+                <a:ea typeface="+mn-ea"/>
+                <a:cs typeface="+mn-cs"/>
+              </a:defRPr>
+            </a:lvl3pPr>
+            <a:lvl4pPr marL="1600200" indent="-228600" algn="l" defTabSz="457200" rtl="0" eaLnBrk="1" latinLnBrk="0" hangingPunct="1">
+              <a:spcBef>
+                <a:spcPct val="20000"/>
+              </a:spcBef>
+              <a:buFont typeface="Arial"/>
+              <a:buChar char="–"/>
+              <a:defRPr sz="2000" kern="1200">
+                <a:solidFill>
+                  <a:schemeClr val="tx1"/>
+                </a:solidFill>
+                <a:latin typeface="+mn-lt"/>
+                <a:ea typeface="+mn-ea"/>
+                <a:cs typeface="+mn-cs"/>
+              </a:defRPr>
+            </a:lvl4pPr>
+            <a:lvl5pPr marL="2057400" indent="-228600" algn="l" defTabSz="457200" rtl="0" eaLnBrk="1" latinLnBrk="0" hangingPunct="1">
+              <a:spcBef>
+                <a:spcPct val="20000"/>
+              </a:spcBef>
+              <a:buFont typeface="Arial"/>
+              <a:buChar char="»"/>
+              <a:defRPr sz="2000" kern="1200">
+                <a:solidFill>
+                  <a:schemeClr val="tx1"/>
+                </a:solidFill>
+                <a:latin typeface="+mn-lt"/>
+                <a:ea typeface="+mn-ea"/>
+                <a:cs typeface="+mn-cs"/>
+              </a:defRPr>
+            </a:lvl5pPr>
+            <a:lvl6pPr marL="2514600" indent="-228600" algn="l" defTabSz="457200" rtl="0" eaLnBrk="1" latinLnBrk="0" hangingPunct="1">
+              <a:spcBef>
+                <a:spcPct val="20000"/>
+              </a:spcBef>
+              <a:buFont typeface="Arial"/>
+              <a:buChar char="•"/>
+              <a:defRPr sz="2000" kern="1200">
+                <a:solidFill>
+                  <a:schemeClr val="tx1"/>
+                </a:solidFill>
+                <a:latin typeface="+mn-lt"/>
+                <a:ea typeface="+mn-ea"/>
+                <a:cs typeface="+mn-cs"/>
+              </a:defRPr>
+            </a:lvl6pPr>
+            <a:lvl7pPr marL="2971800" indent="-228600" algn="l" defTabSz="457200" rtl="0" eaLnBrk="1" latinLnBrk="0" hangingPunct="1">
+              <a:spcBef>
+                <a:spcPct val="20000"/>
+              </a:spcBef>
+              <a:buFont typeface="Arial"/>
+              <a:buChar char="•"/>
+              <a:defRPr sz="2000" kern="1200">
+                <a:solidFill>
+                  <a:schemeClr val="tx1"/>
+                </a:solidFill>
+                <a:latin typeface="+mn-lt"/>
+                <a:ea typeface="+mn-ea"/>
+                <a:cs typeface="+mn-cs"/>
+              </a:defRPr>
+            </a:lvl7pPr>
+            <a:lvl8pPr marL="3429000" indent="-228600" algn="l" defTabSz="457200" rtl="0" eaLnBrk="1" latinLnBrk="0" hangingPunct="1">
+              <a:spcBef>
+                <a:spcPct val="20000"/>
+              </a:spcBef>
+              <a:buFont typeface="Arial"/>
+              <a:buChar char="•"/>
+              <a:defRPr sz="2000" kern="1200">
+                <a:solidFill>
+                  <a:schemeClr val="tx1"/>
+                </a:solidFill>
+                <a:latin typeface="+mn-lt"/>
+                <a:ea typeface="+mn-ea"/>
+                <a:cs typeface="+mn-cs"/>
+              </a:defRPr>
+            </a:lvl8pPr>
+            <a:lvl9pPr marL="3886200" indent="-228600" algn="l" defTabSz="457200" rtl="0" eaLnBrk="1" latinLnBrk="0" hangingPunct="1">
+              <a:spcBef>
+                <a:spcPct val="20000"/>
+              </a:spcBef>
+              <a:buFont typeface="Arial"/>
+              <a:buChar char="•"/>
+              <a:defRPr sz="2000" kern="1200">
+                <a:solidFill>
+                  <a:schemeClr val="tx1"/>
+                </a:solidFill>
+                <a:latin typeface="+mn-lt"/>
+                <a:ea typeface="+mn-ea"/>
+                <a:cs typeface="+mn-cs"/>
+              </a:defRPr>
+            </a:lvl9pPr>
+          </a:lstStyle>
+          <a:p>
+            <a:pPr marL="0" indent="0">
+              <a:buFont typeface="Arial"/>
+              <a:buNone/>
+            </a:pPr>
+            <a:endParaRPr lang="en-US" sz="1200" dirty="0"/>
+          </a:p>
+        </p:txBody>
+      </p:sp>
       <p:pic>
         <p:nvPicPr>
           <p:cNvPr id="8" name="Picture 7" descr="ICOADSRDA.tiff"/>
@@ -6943,6 +7460,563 @@
 </p:sld>
 </file>
 
+<file path=ppt/slides/slide19.xml><?xml version="1.0" encoding="utf-8"?>
+<p:sld xmlns:a="http://schemas.openxmlformats.org/drawingml/2006/main" xmlns:r="http://schemas.openxmlformats.org/officeDocument/2006/relationships" xmlns:p="http://schemas.openxmlformats.org/presentationml/2006/main">
+  <p:cSld>
+    <p:spTree>
+      <p:nvGrpSpPr>
+        <p:cNvPr id="1" name=""/>
+        <p:cNvGrpSpPr/>
+        <p:nvPr/>
+      </p:nvGrpSpPr>
+      <p:grpSpPr>
+        <a:xfrm>
+          <a:off x="0" y="0"/>
+          <a:ext cx="0" cy="0"/>
+          <a:chOff x="0" y="0"/>
+          <a:chExt cx="0" cy="0"/>
+        </a:xfrm>
+      </p:grpSpPr>
+      <p:sp>
+        <p:nvSpPr>
+          <p:cNvPr id="2" name="Title 1"/>
+          <p:cNvSpPr>
+            <a:spLocks noGrp="1"/>
+          </p:cNvSpPr>
+          <p:nvPr>
+            <p:ph type="title"/>
+          </p:nvPr>
+        </p:nvSpPr>
+        <p:spPr/>
+        <p:txBody>
+          <a:bodyPr>
+            <a:normAutofit/>
+          </a:bodyPr>
+          <a:lstStyle/>
+          <a:p>
+            <a:r>
+              <a:rPr lang="en-US" dirty="0" smtClean="0"/>
+              <a:t>RDA ICOADS record</a:t>
+            </a:r>
+            <a:endParaRPr lang="en-US" dirty="0"/>
+          </a:p>
+        </p:txBody>
+      </p:sp>
+      <p:sp>
+        <p:nvSpPr>
+          <p:cNvPr id="6" name="Content Placeholder 2"/>
+          <p:cNvSpPr txBox="1">
+            <a:spLocks/>
+          </p:cNvSpPr>
+          <p:nvPr/>
+        </p:nvSpPr>
+        <p:spPr>
+          <a:xfrm>
+            <a:off x="609599" y="3499075"/>
+            <a:ext cx="4129133" cy="851921"/>
+          </a:xfrm>
+          <a:prstGeom prst="rect">
+            <a:avLst/>
+          </a:prstGeom>
+        </p:spPr>
+        <p:txBody>
+          <a:bodyPr vert="horz" lIns="91440" tIns="45720" rIns="91440" bIns="45720" rtlCol="0">
+            <a:normAutofit/>
+          </a:bodyPr>
+          <a:lstStyle>
+            <a:lvl1pPr marL="342900" indent="-342900" algn="l" defTabSz="457200" rtl="0" eaLnBrk="1" latinLnBrk="0" hangingPunct="1">
+              <a:spcBef>
+                <a:spcPct val="20000"/>
+              </a:spcBef>
+              <a:buFont typeface="Arial"/>
+              <a:buChar char="•"/>
+              <a:defRPr sz="3200" kern="1200">
+                <a:solidFill>
+                  <a:schemeClr val="tx1"/>
+                </a:solidFill>
+                <a:latin typeface="+mn-lt"/>
+                <a:ea typeface="+mn-ea"/>
+                <a:cs typeface="+mn-cs"/>
+              </a:defRPr>
+            </a:lvl1pPr>
+            <a:lvl2pPr marL="742950" indent="-285750" algn="l" defTabSz="457200" rtl="0" eaLnBrk="1" latinLnBrk="0" hangingPunct="1">
+              <a:spcBef>
+                <a:spcPct val="20000"/>
+              </a:spcBef>
+              <a:buFont typeface="Arial"/>
+              <a:buChar char="–"/>
+              <a:defRPr sz="2800" kern="1200">
+                <a:solidFill>
+                  <a:schemeClr val="tx1"/>
+                </a:solidFill>
+                <a:latin typeface="+mn-lt"/>
+                <a:ea typeface="+mn-ea"/>
+                <a:cs typeface="+mn-cs"/>
+              </a:defRPr>
+            </a:lvl2pPr>
+            <a:lvl3pPr marL="1143000" indent="-228600" algn="l" defTabSz="457200" rtl="0" eaLnBrk="1" latinLnBrk="0" hangingPunct="1">
+              <a:spcBef>
+                <a:spcPct val="20000"/>
+              </a:spcBef>
+              <a:buFont typeface="Arial"/>
+              <a:buChar char="•"/>
+              <a:defRPr sz="2400" kern="1200">
+                <a:solidFill>
+                  <a:schemeClr val="tx1"/>
+                </a:solidFill>
+                <a:latin typeface="+mn-lt"/>
+                <a:ea typeface="+mn-ea"/>
+                <a:cs typeface="+mn-cs"/>
+              </a:defRPr>
+            </a:lvl3pPr>
+            <a:lvl4pPr marL="1600200" indent="-228600" algn="l" defTabSz="457200" rtl="0" eaLnBrk="1" latinLnBrk="0" hangingPunct="1">
+              <a:spcBef>
+                <a:spcPct val="20000"/>
+              </a:spcBef>
+              <a:buFont typeface="Arial"/>
+              <a:buChar char="–"/>
+              <a:defRPr sz="2000" kern="1200">
+                <a:solidFill>
+                  <a:schemeClr val="tx1"/>
+                </a:solidFill>
+                <a:latin typeface="+mn-lt"/>
+                <a:ea typeface="+mn-ea"/>
+                <a:cs typeface="+mn-cs"/>
+              </a:defRPr>
+            </a:lvl4pPr>
+            <a:lvl5pPr marL="2057400" indent="-228600" algn="l" defTabSz="457200" rtl="0" eaLnBrk="1" latinLnBrk="0" hangingPunct="1">
+              <a:spcBef>
+                <a:spcPct val="20000"/>
+              </a:spcBef>
+              <a:buFont typeface="Arial"/>
+              <a:buChar char="»"/>
+              <a:defRPr sz="2000" kern="1200">
+                <a:solidFill>
+                  <a:schemeClr val="tx1"/>
+                </a:solidFill>
+                <a:latin typeface="+mn-lt"/>
+                <a:ea typeface="+mn-ea"/>
+                <a:cs typeface="+mn-cs"/>
+              </a:defRPr>
+            </a:lvl5pPr>
+            <a:lvl6pPr marL="2514600" indent="-228600" algn="l" defTabSz="457200" rtl="0" eaLnBrk="1" latinLnBrk="0" hangingPunct="1">
+              <a:spcBef>
+                <a:spcPct val="20000"/>
+              </a:spcBef>
+              <a:buFont typeface="Arial"/>
+              <a:buChar char="•"/>
+              <a:defRPr sz="2000" kern="1200">
+                <a:solidFill>
+                  <a:schemeClr val="tx1"/>
+                </a:solidFill>
+                <a:latin typeface="+mn-lt"/>
+                <a:ea typeface="+mn-ea"/>
+                <a:cs typeface="+mn-cs"/>
+              </a:defRPr>
+            </a:lvl6pPr>
+            <a:lvl7pPr marL="2971800" indent="-228600" algn="l" defTabSz="457200" rtl="0" eaLnBrk="1" latinLnBrk="0" hangingPunct="1">
+              <a:spcBef>
+                <a:spcPct val="20000"/>
+              </a:spcBef>
+              <a:buFont typeface="Arial"/>
+              <a:buChar char="•"/>
+              <a:defRPr sz="2000" kern="1200">
+                <a:solidFill>
+                  <a:schemeClr val="tx1"/>
+                </a:solidFill>
+                <a:latin typeface="+mn-lt"/>
+                <a:ea typeface="+mn-ea"/>
+                <a:cs typeface="+mn-cs"/>
+              </a:defRPr>
+            </a:lvl7pPr>
+            <a:lvl8pPr marL="3429000" indent="-228600" algn="l" defTabSz="457200" rtl="0" eaLnBrk="1" latinLnBrk="0" hangingPunct="1">
+              <a:spcBef>
+                <a:spcPct val="20000"/>
+              </a:spcBef>
+              <a:buFont typeface="Arial"/>
+              <a:buChar char="•"/>
+              <a:defRPr sz="2000" kern="1200">
+                <a:solidFill>
+                  <a:schemeClr val="tx1"/>
+                </a:solidFill>
+                <a:latin typeface="+mn-lt"/>
+                <a:ea typeface="+mn-ea"/>
+                <a:cs typeface="+mn-cs"/>
+              </a:defRPr>
+            </a:lvl8pPr>
+            <a:lvl9pPr marL="3886200" indent="-228600" algn="l" defTabSz="457200" rtl="0" eaLnBrk="1" latinLnBrk="0" hangingPunct="1">
+              <a:spcBef>
+                <a:spcPct val="20000"/>
+              </a:spcBef>
+              <a:buFont typeface="Arial"/>
+              <a:buChar char="•"/>
+              <a:defRPr sz="2000" kern="1200">
+                <a:solidFill>
+                  <a:schemeClr val="tx1"/>
+                </a:solidFill>
+                <a:latin typeface="+mn-lt"/>
+                <a:ea typeface="+mn-ea"/>
+                <a:cs typeface="+mn-cs"/>
+              </a:defRPr>
+            </a:lvl9pPr>
+          </a:lstStyle>
+          <a:p>
+            <a:pPr marL="0" indent="0">
+              <a:buFont typeface="Arial"/>
+              <a:buNone/>
+            </a:pPr>
+            <a:endParaRPr lang="en-US" sz="1200" dirty="0"/>
+          </a:p>
+        </p:txBody>
+      </p:sp>
+    </p:spTree>
+    <p:extLst>
+      <p:ext uri="{BB962C8B-B14F-4D97-AF65-F5344CB8AC3E}">
+        <p14:creationId xmlns:p14="http://schemas.microsoft.com/office/powerpoint/2010/main" val="3868167453"/>
+      </p:ext>
+    </p:extLst>
+  </p:cSld>
+  <p:clrMapOvr>
+    <a:masterClrMapping/>
+  </p:clrMapOvr>
+</p:sld>
+</file>
+
+<file path=ppt/slides/slide2.xml><?xml version="1.0" encoding="utf-8"?>
+<p:sld xmlns:a="http://schemas.openxmlformats.org/drawingml/2006/main" xmlns:r="http://schemas.openxmlformats.org/officeDocument/2006/relationships" xmlns:p="http://schemas.openxmlformats.org/presentationml/2006/main">
+  <p:cSld>
+    <p:spTree>
+      <p:nvGrpSpPr>
+        <p:cNvPr id="1" name=""/>
+        <p:cNvGrpSpPr/>
+        <p:nvPr/>
+      </p:nvGrpSpPr>
+      <p:grpSpPr>
+        <a:xfrm>
+          <a:off x="0" y="0"/>
+          <a:ext cx="0" cy="0"/>
+          <a:chOff x="0" y="0"/>
+          <a:chExt cx="0" cy="0"/>
+        </a:xfrm>
+      </p:grpSpPr>
+      <p:pic>
+        <p:nvPicPr>
+          <p:cNvPr id="2" name="Picture 1" descr="seeingstandards.pdf"/>
+          <p:cNvPicPr>
+            <a:picLocks noChangeAspect="1"/>
+          </p:cNvPicPr>
+          <p:nvPr/>
+        </p:nvPicPr>
+        <p:blipFill>
+          <a:blip r:embed="rId2">
+            <a:extLst>
+              <a:ext uri="{28A0092B-C50C-407E-A947-70E740481C1C}">
+                <a14:useLocalDpi xmlns:a14="http://schemas.microsoft.com/office/drawing/2010/main" val="0"/>
+              </a:ext>
+            </a:extLst>
+          </a:blip>
+          <a:stretch>
+            <a:fillRect/>
+          </a:stretch>
+        </p:blipFill>
+        <p:spPr>
+          <a:xfrm>
+            <a:off x="0" y="2103271"/>
+            <a:ext cx="9144000" cy="3048000"/>
+          </a:xfrm>
+          <a:prstGeom prst="rect">
+            <a:avLst/>
+          </a:prstGeom>
+        </p:spPr>
+      </p:pic>
+      <p:sp>
+        <p:nvSpPr>
+          <p:cNvPr id="3" name="Title 1"/>
+          <p:cNvSpPr txBox="1">
+            <a:spLocks/>
+          </p:cNvSpPr>
+          <p:nvPr/>
+        </p:nvSpPr>
+        <p:spPr>
+          <a:xfrm>
+            <a:off x="457200" y="274638"/>
+            <a:ext cx="8229600" cy="1143000"/>
+          </a:xfrm>
+          <a:prstGeom prst="rect">
+            <a:avLst/>
+          </a:prstGeom>
+        </p:spPr>
+        <p:txBody>
+          <a:bodyPr>
+            <a:noAutofit/>
+          </a:bodyPr>
+          <a:lstStyle>
+            <a:lvl1pPr algn="ctr" defTabSz="457200" rtl="0" eaLnBrk="1" latinLnBrk="0" hangingPunct="1">
+              <a:spcBef>
+                <a:spcPct val="0"/>
+              </a:spcBef>
+              <a:buNone/>
+              <a:defRPr sz="4400" kern="1200">
+                <a:solidFill>
+                  <a:schemeClr val="tx1"/>
+                </a:solidFill>
+                <a:latin typeface="+mj-lt"/>
+                <a:ea typeface="+mj-ea"/>
+                <a:cs typeface="+mj-cs"/>
+              </a:defRPr>
+            </a:lvl1pPr>
+          </a:lstStyle>
+          <a:p>
+            <a:r>
+              <a:rPr lang="en-US" sz="3600" dirty="0" smtClean="0"/>
+              <a:t>“The great thing about standards is that there’s so many of them”</a:t>
+            </a:r>
+            <a:endParaRPr lang="en-US" sz="3600" i="1" dirty="0"/>
+          </a:p>
+        </p:txBody>
+      </p:sp>
+    </p:spTree>
+    <p:extLst>
+      <p:ext uri="{BB962C8B-B14F-4D97-AF65-F5344CB8AC3E}">
+        <p14:creationId xmlns:p14="http://schemas.microsoft.com/office/powerpoint/2010/main" val="298525638"/>
+      </p:ext>
+    </p:extLst>
+  </p:cSld>
+  <p:clrMapOvr>
+    <a:masterClrMapping/>
+  </p:clrMapOvr>
+  <p:timing>
+    <p:tnLst>
+      <p:par>
+        <p:cTn xmlns:p14="http://schemas.microsoft.com/office/powerpoint/2010/main" id="1" dur="indefinite" restart="never" nodeType="tmRoot"/>
+      </p:par>
+    </p:tnLst>
+  </p:timing>
+</p:sld>
+</file>
+
+<file path=ppt/slides/slide20.xml><?xml version="1.0" encoding="utf-8"?>
+<p:sld xmlns:a="http://schemas.openxmlformats.org/drawingml/2006/main" xmlns:r="http://schemas.openxmlformats.org/officeDocument/2006/relationships" xmlns:p="http://schemas.openxmlformats.org/presentationml/2006/main">
+  <p:cSld>
+    <p:spTree>
+      <p:nvGrpSpPr>
+        <p:cNvPr id="1" name=""/>
+        <p:cNvGrpSpPr/>
+        <p:nvPr/>
+      </p:nvGrpSpPr>
+      <p:grpSpPr>
+        <a:xfrm>
+          <a:off x="0" y="0"/>
+          <a:ext cx="0" cy="0"/>
+          <a:chOff x="0" y="0"/>
+          <a:chExt cx="0" cy="0"/>
+        </a:xfrm>
+      </p:grpSpPr>
+      <p:sp>
+        <p:nvSpPr>
+          <p:cNvPr id="2" name="Title 1"/>
+          <p:cNvSpPr>
+            <a:spLocks noGrp="1"/>
+          </p:cNvSpPr>
+          <p:nvPr>
+            <p:ph type="title"/>
+          </p:nvPr>
+        </p:nvSpPr>
+        <p:spPr/>
+        <p:txBody>
+          <a:bodyPr>
+            <a:normAutofit/>
+          </a:bodyPr>
+          <a:lstStyle/>
+          <a:p>
+            <a:r>
+              <a:rPr lang="en-US" dirty="0" smtClean="0"/>
+              <a:t>GCMD ICOADS record</a:t>
+            </a:r>
+            <a:endParaRPr lang="en-US" dirty="0"/>
+          </a:p>
+        </p:txBody>
+      </p:sp>
+      <p:sp>
+        <p:nvSpPr>
+          <p:cNvPr id="6" name="Content Placeholder 2"/>
+          <p:cNvSpPr txBox="1">
+            <a:spLocks/>
+          </p:cNvSpPr>
+          <p:nvPr/>
+        </p:nvSpPr>
+        <p:spPr>
+          <a:xfrm>
+            <a:off x="609599" y="3499075"/>
+            <a:ext cx="4129133" cy="851921"/>
+          </a:xfrm>
+          <a:prstGeom prst="rect">
+            <a:avLst/>
+          </a:prstGeom>
+        </p:spPr>
+        <p:txBody>
+          <a:bodyPr vert="horz" lIns="91440" tIns="45720" rIns="91440" bIns="45720" rtlCol="0">
+            <a:normAutofit/>
+          </a:bodyPr>
+          <a:lstStyle>
+            <a:lvl1pPr marL="342900" indent="-342900" algn="l" defTabSz="457200" rtl="0" eaLnBrk="1" latinLnBrk="0" hangingPunct="1">
+              <a:spcBef>
+                <a:spcPct val="20000"/>
+              </a:spcBef>
+              <a:buFont typeface="Arial"/>
+              <a:buChar char="•"/>
+              <a:defRPr sz="3200" kern="1200">
+                <a:solidFill>
+                  <a:schemeClr val="tx1"/>
+                </a:solidFill>
+                <a:latin typeface="+mn-lt"/>
+                <a:ea typeface="+mn-ea"/>
+                <a:cs typeface="+mn-cs"/>
+              </a:defRPr>
+            </a:lvl1pPr>
+            <a:lvl2pPr marL="742950" indent="-285750" algn="l" defTabSz="457200" rtl="0" eaLnBrk="1" latinLnBrk="0" hangingPunct="1">
+              <a:spcBef>
+                <a:spcPct val="20000"/>
+              </a:spcBef>
+              <a:buFont typeface="Arial"/>
+              <a:buChar char="–"/>
+              <a:defRPr sz="2800" kern="1200">
+                <a:solidFill>
+                  <a:schemeClr val="tx1"/>
+                </a:solidFill>
+                <a:latin typeface="+mn-lt"/>
+                <a:ea typeface="+mn-ea"/>
+                <a:cs typeface="+mn-cs"/>
+              </a:defRPr>
+            </a:lvl2pPr>
+            <a:lvl3pPr marL="1143000" indent="-228600" algn="l" defTabSz="457200" rtl="0" eaLnBrk="1" latinLnBrk="0" hangingPunct="1">
+              <a:spcBef>
+                <a:spcPct val="20000"/>
+              </a:spcBef>
+              <a:buFont typeface="Arial"/>
+              <a:buChar char="•"/>
+              <a:defRPr sz="2400" kern="1200">
+                <a:solidFill>
+                  <a:schemeClr val="tx1"/>
+                </a:solidFill>
+                <a:latin typeface="+mn-lt"/>
+                <a:ea typeface="+mn-ea"/>
+                <a:cs typeface="+mn-cs"/>
+              </a:defRPr>
+            </a:lvl3pPr>
+            <a:lvl4pPr marL="1600200" indent="-228600" algn="l" defTabSz="457200" rtl="0" eaLnBrk="1" latinLnBrk="0" hangingPunct="1">
+              <a:spcBef>
+                <a:spcPct val="20000"/>
+              </a:spcBef>
+              <a:buFont typeface="Arial"/>
+              <a:buChar char="–"/>
+              <a:defRPr sz="2000" kern="1200">
+                <a:solidFill>
+                  <a:schemeClr val="tx1"/>
+                </a:solidFill>
+                <a:latin typeface="+mn-lt"/>
+                <a:ea typeface="+mn-ea"/>
+                <a:cs typeface="+mn-cs"/>
+              </a:defRPr>
+            </a:lvl4pPr>
+            <a:lvl5pPr marL="2057400" indent="-228600" algn="l" defTabSz="457200" rtl="0" eaLnBrk="1" latinLnBrk="0" hangingPunct="1">
+              <a:spcBef>
+                <a:spcPct val="20000"/>
+              </a:spcBef>
+              <a:buFont typeface="Arial"/>
+              <a:buChar char="»"/>
+              <a:defRPr sz="2000" kern="1200">
+                <a:solidFill>
+                  <a:schemeClr val="tx1"/>
+                </a:solidFill>
+                <a:latin typeface="+mn-lt"/>
+                <a:ea typeface="+mn-ea"/>
+                <a:cs typeface="+mn-cs"/>
+              </a:defRPr>
+            </a:lvl5pPr>
+            <a:lvl6pPr marL="2514600" indent="-228600" algn="l" defTabSz="457200" rtl="0" eaLnBrk="1" latinLnBrk="0" hangingPunct="1">
+              <a:spcBef>
+                <a:spcPct val="20000"/>
+              </a:spcBef>
+              <a:buFont typeface="Arial"/>
+              <a:buChar char="•"/>
+              <a:defRPr sz="2000" kern="1200">
+                <a:solidFill>
+                  <a:schemeClr val="tx1"/>
+                </a:solidFill>
+                <a:latin typeface="+mn-lt"/>
+                <a:ea typeface="+mn-ea"/>
+                <a:cs typeface="+mn-cs"/>
+              </a:defRPr>
+            </a:lvl6pPr>
+            <a:lvl7pPr marL="2971800" indent="-228600" algn="l" defTabSz="457200" rtl="0" eaLnBrk="1" latinLnBrk="0" hangingPunct="1">
+              <a:spcBef>
+                <a:spcPct val="20000"/>
+              </a:spcBef>
+              <a:buFont typeface="Arial"/>
+              <a:buChar char="•"/>
+              <a:defRPr sz="2000" kern="1200">
+                <a:solidFill>
+                  <a:schemeClr val="tx1"/>
+                </a:solidFill>
+                <a:latin typeface="+mn-lt"/>
+                <a:ea typeface="+mn-ea"/>
+                <a:cs typeface="+mn-cs"/>
+              </a:defRPr>
+            </a:lvl7pPr>
+            <a:lvl8pPr marL="3429000" indent="-228600" algn="l" defTabSz="457200" rtl="0" eaLnBrk="1" latinLnBrk="0" hangingPunct="1">
+              <a:spcBef>
+                <a:spcPct val="20000"/>
+              </a:spcBef>
+              <a:buFont typeface="Arial"/>
+              <a:buChar char="•"/>
+              <a:defRPr sz="2000" kern="1200">
+                <a:solidFill>
+                  <a:schemeClr val="tx1"/>
+                </a:solidFill>
+                <a:latin typeface="+mn-lt"/>
+                <a:ea typeface="+mn-ea"/>
+                <a:cs typeface="+mn-cs"/>
+              </a:defRPr>
+            </a:lvl8pPr>
+            <a:lvl9pPr marL="3886200" indent="-228600" algn="l" defTabSz="457200" rtl="0" eaLnBrk="1" latinLnBrk="0" hangingPunct="1">
+              <a:spcBef>
+                <a:spcPct val="20000"/>
+              </a:spcBef>
+              <a:buFont typeface="Arial"/>
+              <a:buChar char="•"/>
+              <a:defRPr sz="2000" kern="1200">
+                <a:solidFill>
+                  <a:schemeClr val="tx1"/>
+                </a:solidFill>
+                <a:latin typeface="+mn-lt"/>
+                <a:ea typeface="+mn-ea"/>
+                <a:cs typeface="+mn-cs"/>
+              </a:defRPr>
+            </a:lvl9pPr>
+          </a:lstStyle>
+          <a:p>
+            <a:pPr marL="0" indent="0">
+              <a:buFont typeface="Arial"/>
+              <a:buNone/>
+            </a:pPr>
+            <a:endParaRPr lang="en-US" sz="1200" dirty="0"/>
+          </a:p>
+        </p:txBody>
+      </p:sp>
+    </p:spTree>
+    <p:extLst>
+      <p:ext uri="{BB962C8B-B14F-4D97-AF65-F5344CB8AC3E}">
+        <p14:creationId xmlns:p14="http://schemas.microsoft.com/office/powerpoint/2010/main" val="1705260732"/>
+      </p:ext>
+    </p:extLst>
+  </p:cSld>
+  <p:clrMapOvr>
+    <a:masterClrMapping/>
+  </p:clrMapOvr>
+</p:sld>
+</file>
+
 <file path=ppt/slides/slide21.xml><?xml version="1.0" encoding="utf-8"?>
 <p:sld xmlns:a="http://schemas.openxmlformats.org/drawingml/2006/main" xmlns:r="http://schemas.openxmlformats.org/officeDocument/2006/relationships" xmlns:p="http://schemas.openxmlformats.org/presentationml/2006/main">
   <p:cSld>
@@ -7183,10 +8257,6 @@
           <a:bodyPr/>
           <a:lstStyle/>
           <a:p>
-            <a:r>
-              <a:rPr lang="en-US" dirty="0" smtClean="0"/>
-              <a:t>But there’s hope</a:t>
-            </a:r>
             <a:endParaRPr lang="en-US" dirty="0"/>
           </a:p>
         </p:txBody>
@@ -7310,120 +8380,6 @@
 </file>
 
 <file path=ppt/slides/slide24.xml><?xml version="1.0" encoding="utf-8"?>
-<p:sld xmlns:a="http://schemas.openxmlformats.org/drawingml/2006/main" xmlns:r="http://schemas.openxmlformats.org/officeDocument/2006/relationships" xmlns:p="http://schemas.openxmlformats.org/presentationml/2006/main">
-  <p:cSld>
-    <p:spTree>
-      <p:nvGrpSpPr>
-        <p:cNvPr id="1" name=""/>
-        <p:cNvGrpSpPr/>
-        <p:nvPr/>
-      </p:nvGrpSpPr>
-      <p:grpSpPr>
-        <a:xfrm>
-          <a:off x="0" y="0"/>
-          <a:ext cx="0" cy="0"/>
-          <a:chOff x="0" y="0"/>
-          <a:chExt cx="0" cy="0"/>
-        </a:xfrm>
-      </p:grpSpPr>
-      <p:sp>
-        <p:nvSpPr>
-          <p:cNvPr id="2" name="Title 1"/>
-          <p:cNvSpPr>
-            <a:spLocks noGrp="1"/>
-          </p:cNvSpPr>
-          <p:nvPr>
-            <p:ph type="title"/>
-          </p:nvPr>
-        </p:nvSpPr>
-        <p:spPr/>
-        <p:txBody>
-          <a:bodyPr/>
-          <a:lstStyle/>
-          <a:p>
-            <a:r>
-              <a:rPr lang="en-US" dirty="0" err="1" smtClean="0"/>
-              <a:t>Crosswalking</a:t>
-            </a:r>
-            <a:endParaRPr lang="en-US" dirty="0"/>
-          </a:p>
-        </p:txBody>
-      </p:sp>
-      <p:sp>
-        <p:nvSpPr>
-          <p:cNvPr id="3" name="Content Placeholder 2"/>
-          <p:cNvSpPr>
-            <a:spLocks noGrp="1"/>
-          </p:cNvSpPr>
-          <p:nvPr>
-            <p:ph idx="1"/>
-          </p:nvPr>
-        </p:nvSpPr>
-        <p:spPr>
-          <a:xfrm>
-            <a:off x="4551053" y="1600201"/>
-            <a:ext cx="3986581" cy="4062612"/>
-          </a:xfrm>
-        </p:spPr>
-        <p:txBody>
-          <a:bodyPr/>
-          <a:lstStyle/>
-          <a:p>
-            <a:endParaRPr lang="en-US" dirty="0"/>
-          </a:p>
-        </p:txBody>
-      </p:sp>
-      <p:pic>
-        <p:nvPicPr>
-          <p:cNvPr id="5" name="Picture 4" descr="imgres.jpg"/>
-          <p:cNvPicPr>
-            <a:picLocks noChangeAspect="1"/>
-          </p:cNvPicPr>
-          <p:nvPr/>
-        </p:nvPicPr>
-        <p:blipFill>
-          <a:blip r:embed="rId2">
-            <a:extLst>
-              <a:ext uri="{28A0092B-C50C-407E-A947-70E740481C1C}">
-                <a14:useLocalDpi xmlns:a14="http://schemas.microsoft.com/office/drawing/2010/main" val="0"/>
-              </a:ext>
-            </a:extLst>
-          </a:blip>
-          <a:stretch>
-            <a:fillRect/>
-          </a:stretch>
-        </p:blipFill>
-        <p:spPr>
-          <a:xfrm>
-            <a:off x="568061" y="1842643"/>
-            <a:ext cx="2959887" cy="3551865"/>
-          </a:xfrm>
-          <a:prstGeom prst="rect">
-            <a:avLst/>
-          </a:prstGeom>
-        </p:spPr>
-      </p:pic>
-    </p:spTree>
-    <p:extLst>
-      <p:ext uri="{BB962C8B-B14F-4D97-AF65-F5344CB8AC3E}">
-        <p14:creationId xmlns:p14="http://schemas.microsoft.com/office/powerpoint/2010/main" val="3104686356"/>
-      </p:ext>
-    </p:extLst>
-  </p:cSld>
-  <p:clrMapOvr>
-    <a:masterClrMapping/>
-  </p:clrMapOvr>
-  <p:timing>
-    <p:tnLst>
-      <p:par>
-        <p:cTn xmlns:p14="http://schemas.microsoft.com/office/powerpoint/2010/main" id="1" dur="indefinite" restart="never" nodeType="tmRoot"/>
-      </p:par>
-    </p:tnLst>
-  </p:timing>
-</p:sld>
-</file>
-
-<file path=ppt/slides/slide25.xml><?xml version="1.0" encoding="utf-8"?>
 <p:sld xmlns:a="http://schemas.openxmlformats.org/drawingml/2006/main" xmlns:r="http://schemas.openxmlformats.org/officeDocument/2006/relationships" xmlns:p="http://schemas.openxmlformats.org/presentationml/2006/main">
   <p:cSld>
     <p:spTree>
@@ -7483,6 +8439,120 @@
 </p:sld>
 </file>
 
+<file path=ppt/slides/slide25.xml><?xml version="1.0" encoding="utf-8"?>
+<p:sld xmlns:a="http://schemas.openxmlformats.org/drawingml/2006/main" xmlns:r="http://schemas.openxmlformats.org/officeDocument/2006/relationships" xmlns:p="http://schemas.openxmlformats.org/presentationml/2006/main">
+  <p:cSld>
+    <p:spTree>
+      <p:nvGrpSpPr>
+        <p:cNvPr id="1" name=""/>
+        <p:cNvGrpSpPr/>
+        <p:nvPr/>
+      </p:nvGrpSpPr>
+      <p:grpSpPr>
+        <a:xfrm>
+          <a:off x="0" y="0"/>
+          <a:ext cx="0" cy="0"/>
+          <a:chOff x="0" y="0"/>
+          <a:chExt cx="0" cy="0"/>
+        </a:xfrm>
+      </p:grpSpPr>
+      <p:sp>
+        <p:nvSpPr>
+          <p:cNvPr id="2" name="Title 1"/>
+          <p:cNvSpPr>
+            <a:spLocks noGrp="1"/>
+          </p:cNvSpPr>
+          <p:nvPr>
+            <p:ph type="title"/>
+          </p:nvPr>
+        </p:nvSpPr>
+        <p:spPr/>
+        <p:txBody>
+          <a:bodyPr/>
+          <a:lstStyle/>
+          <a:p>
+            <a:r>
+              <a:rPr lang="en-US" dirty="0" err="1" smtClean="0"/>
+              <a:t>Crosswalking</a:t>
+            </a:r>
+            <a:endParaRPr lang="en-US" dirty="0"/>
+          </a:p>
+        </p:txBody>
+      </p:sp>
+      <p:sp>
+        <p:nvSpPr>
+          <p:cNvPr id="3" name="Content Placeholder 2"/>
+          <p:cNvSpPr>
+            <a:spLocks noGrp="1"/>
+          </p:cNvSpPr>
+          <p:nvPr>
+            <p:ph idx="1"/>
+          </p:nvPr>
+        </p:nvSpPr>
+        <p:spPr>
+          <a:xfrm>
+            <a:off x="4551053" y="1600201"/>
+            <a:ext cx="3986581" cy="4062612"/>
+          </a:xfrm>
+        </p:spPr>
+        <p:txBody>
+          <a:bodyPr/>
+          <a:lstStyle/>
+          <a:p>
+            <a:endParaRPr lang="en-US" dirty="0"/>
+          </a:p>
+        </p:txBody>
+      </p:sp>
+      <p:pic>
+        <p:nvPicPr>
+          <p:cNvPr id="5" name="Picture 4" descr="imgres.jpg"/>
+          <p:cNvPicPr>
+            <a:picLocks noChangeAspect="1"/>
+          </p:cNvPicPr>
+          <p:nvPr/>
+        </p:nvPicPr>
+        <p:blipFill>
+          <a:blip r:embed="rId2">
+            <a:extLst>
+              <a:ext uri="{28A0092B-C50C-407E-A947-70E740481C1C}">
+                <a14:useLocalDpi xmlns:a14="http://schemas.microsoft.com/office/drawing/2010/main" val="0"/>
+              </a:ext>
+            </a:extLst>
+          </a:blip>
+          <a:stretch>
+            <a:fillRect/>
+          </a:stretch>
+        </p:blipFill>
+        <p:spPr>
+          <a:xfrm>
+            <a:off x="568061" y="1842643"/>
+            <a:ext cx="2959887" cy="3551865"/>
+          </a:xfrm>
+          <a:prstGeom prst="rect">
+            <a:avLst/>
+          </a:prstGeom>
+        </p:spPr>
+      </p:pic>
+    </p:spTree>
+    <p:extLst>
+      <p:ext uri="{BB962C8B-B14F-4D97-AF65-F5344CB8AC3E}">
+        <p14:creationId xmlns:p14="http://schemas.microsoft.com/office/powerpoint/2010/main" val="3104686356"/>
+      </p:ext>
+    </p:extLst>
+  </p:cSld>
+  <p:clrMapOvr>
+    <a:masterClrMapping/>
+  </p:clrMapOvr>
+  <p:timing>
+    <p:tnLst>
+      <p:par>
+        <p:cTn xmlns:p14="http://schemas.microsoft.com/office/powerpoint/2010/main" id="1" dur="indefinite" restart="never" nodeType="tmRoot"/>
+      </p:par>
+    </p:tnLst>
+  </p:timing>
+</p:sld>
+</file>
+
 <file path=ppt/slides/slide26.xml><?xml version="1.0" encoding="utf-8"?>
 <p:sld xmlns:a="http://schemas.openxmlformats.org/drawingml/2006/main" xmlns:r="http://schemas.openxmlformats.org/officeDocument/2006/relationships" xmlns:p="http://schemas.openxmlformats.org/presentationml/2006/main">
   <p:cSld>
@@ -7560,6 +8630,96 @@
           </a:p>
         </p:txBody>
       </p:sp>
+    </p:spTree>
+    <p:extLst>
+      <p:ext uri="{BB962C8B-B14F-4D97-AF65-F5344CB8AC3E}">
+        <p14:creationId xmlns:p14="http://schemas.microsoft.com/office/powerpoint/2010/main" val="1052552331"/>
+      </p:ext>
+    </p:extLst>
+  </p:cSld>
+  <p:clrMapOvr>
+    <a:masterClrMapping/>
+  </p:clrMapOvr>
+</p:sld>
+</file>
+
+<file path=ppt/slides/slide27.xml><?xml version="1.0" encoding="utf-8"?>
+<p:sld xmlns:a="http://schemas.openxmlformats.org/drawingml/2006/main" xmlns:r="http://schemas.openxmlformats.org/officeDocument/2006/relationships" xmlns:p="http://schemas.openxmlformats.org/presentationml/2006/main">
+  <p:cSld>
+    <p:spTree>
+      <p:nvGrpSpPr>
+        <p:cNvPr id="1" name=""/>
+        <p:cNvGrpSpPr/>
+        <p:nvPr/>
+      </p:nvGrpSpPr>
+      <p:grpSpPr>
+        <a:xfrm>
+          <a:off x="0" y="0"/>
+          <a:ext cx="0" cy="0"/>
+          <a:chOff x="0" y="0"/>
+          <a:chExt cx="0" cy="0"/>
+        </a:xfrm>
+      </p:grpSpPr>
+      <p:pic>
+        <p:nvPicPr>
+          <p:cNvPr id="4" name="Picture 3" descr="Greenberg2005.tiff"/>
+          <p:cNvPicPr>
+            <a:picLocks noChangeAspect="1"/>
+          </p:cNvPicPr>
+          <p:nvPr/>
+        </p:nvPicPr>
+        <p:blipFill>
+          <a:blip r:embed="rId3">
+            <a:extLst>
+              <a:ext uri="{28A0092B-C50C-407E-A947-70E740481C1C}">
+                <a14:useLocalDpi xmlns:a14="http://schemas.microsoft.com/office/drawing/2010/main" val="0"/>
+              </a:ext>
+            </a:extLst>
+          </a:blip>
+          <a:stretch>
+            <a:fillRect/>
+          </a:stretch>
+        </p:blipFill>
+        <p:spPr>
+          <a:xfrm>
+            <a:off x="282209" y="386278"/>
+            <a:ext cx="8499211" cy="4787814"/>
+          </a:xfrm>
+          <a:prstGeom prst="rect">
+            <a:avLst/>
+          </a:prstGeom>
+        </p:spPr>
+      </p:pic>
+      <p:sp>
+        <p:nvSpPr>
+          <p:cNvPr id="5" name="TextBox 4"/>
+          <p:cNvSpPr txBox="1"/>
+          <p:nvPr/>
+        </p:nvSpPr>
+        <p:spPr>
+          <a:xfrm>
+            <a:off x="5150556" y="5194248"/>
+            <a:ext cx="3499555" cy="379641"/>
+          </a:xfrm>
+          <a:prstGeom prst="rect">
+            <a:avLst/>
+          </a:prstGeom>
+          <a:noFill/>
+        </p:spPr>
+        <p:txBody>
+          <a:bodyPr wrap="square" rtlCol="0">
+            <a:spAutoFit/>
+          </a:bodyPr>
+          <a:lstStyle/>
+          <a:p>
+            <a:r>
+              <a:rPr lang="en-US" dirty="0" smtClean="0"/>
+              <a:t>From Greenberg, 2005</a:t>
+            </a:r>
+            <a:endParaRPr lang="en-US" dirty="0"/>
+          </a:p>
+        </p:txBody>
+      </p:sp>
       <p:sp>
         <p:nvSpPr>
           <p:cNvPr id="2" name="TextBox 1"/>
@@ -7603,6 +8763,276 @@
     <p:extLst>
       <p:ext uri="{BB962C8B-B14F-4D97-AF65-F5344CB8AC3E}">
         <p14:creationId xmlns:p14="http://schemas.microsoft.com/office/powerpoint/2010/main" val="2604942078"/>
+      </p:ext>
+    </p:extLst>
+  </p:cSld>
+  <p:clrMapOvr>
+    <a:masterClrMapping/>
+  </p:clrMapOvr>
+</p:sld>
+</file>
+
+<file path=ppt/slides/slide28.xml><?xml version="1.0" encoding="utf-8"?>
+<p:sld xmlns:a="http://schemas.openxmlformats.org/drawingml/2006/main" xmlns:r="http://schemas.openxmlformats.org/officeDocument/2006/relationships" xmlns:p="http://schemas.openxmlformats.org/presentationml/2006/main">
+  <p:cSld>
+    <p:spTree>
+      <p:nvGrpSpPr>
+        <p:cNvPr id="1" name=""/>
+        <p:cNvGrpSpPr/>
+        <p:nvPr/>
+      </p:nvGrpSpPr>
+      <p:grpSpPr>
+        <a:xfrm>
+          <a:off x="0" y="0"/>
+          <a:ext cx="0" cy="0"/>
+          <a:chOff x="0" y="0"/>
+          <a:chExt cx="0" cy="0"/>
+        </a:xfrm>
+      </p:grpSpPr>
+      <p:sp>
+        <p:nvSpPr>
+          <p:cNvPr id="2" name="Title 1"/>
+          <p:cNvSpPr>
+            <a:spLocks noGrp="1"/>
+          </p:cNvSpPr>
+          <p:nvPr>
+            <p:ph type="title"/>
+          </p:nvPr>
+        </p:nvSpPr>
+        <p:spPr/>
+        <p:txBody>
+          <a:bodyPr/>
+          <a:lstStyle/>
+          <a:p>
+            <a:r>
+              <a:rPr lang="en-US" dirty="0" smtClean="0"/>
+              <a:t>The MODAL framework</a:t>
+            </a:r>
+            <a:endParaRPr lang="en-US" dirty="0"/>
+          </a:p>
+        </p:txBody>
+      </p:sp>
+      <p:sp>
+        <p:nvSpPr>
+          <p:cNvPr id="3" name="Content Placeholder 2"/>
+          <p:cNvSpPr>
+            <a:spLocks noGrp="1"/>
+          </p:cNvSpPr>
+          <p:nvPr>
+            <p:ph idx="1"/>
+          </p:nvPr>
+        </p:nvSpPr>
+        <p:spPr/>
+        <p:txBody>
+          <a:bodyPr/>
+          <a:lstStyle/>
+          <a:p>
+            <a:r>
+              <a:rPr lang="en-US" dirty="0" smtClean="0"/>
+              <a:t>Developed by Jane Greenberg (Drexel)</a:t>
+            </a:r>
+          </a:p>
+          <a:p>
+            <a:r>
+              <a:rPr lang="en-US" dirty="0"/>
+              <a:t>Conceptual framework for </a:t>
+            </a:r>
+            <a:r>
+              <a:rPr lang="en-US" dirty="0" smtClean="0"/>
+              <a:t>analyzing </a:t>
+            </a:r>
+            <a:r>
+              <a:rPr lang="en-US" b="1" u="sng" dirty="0" smtClean="0"/>
+              <a:t>M</a:t>
+            </a:r>
+            <a:r>
+              <a:rPr lang="en-US" dirty="0" smtClean="0"/>
+              <a:t>etadata </a:t>
+            </a:r>
+            <a:r>
+              <a:rPr lang="en-US" b="1" u="sng" dirty="0" smtClean="0"/>
+              <a:t>O</a:t>
+            </a:r>
+            <a:r>
+              <a:rPr lang="en-US" dirty="0" smtClean="0"/>
+              <a:t>bjectives and principles, </a:t>
+            </a:r>
+            <a:r>
+              <a:rPr lang="en-US" b="1" u="sng" dirty="0" smtClean="0"/>
+              <a:t>D</a:t>
+            </a:r>
+            <a:r>
+              <a:rPr lang="en-US" dirty="0" smtClean="0"/>
+              <a:t>omain, and </a:t>
+            </a:r>
+            <a:r>
+              <a:rPr lang="en-US" b="1" u="sng" dirty="0" smtClean="0"/>
+              <a:t>A</a:t>
+            </a:r>
+            <a:r>
+              <a:rPr lang="en-US" dirty="0" smtClean="0"/>
+              <a:t>rchitectural </a:t>
+            </a:r>
+            <a:r>
+              <a:rPr lang="en-US" b="1" u="sng" dirty="0" smtClean="0"/>
+              <a:t>L</a:t>
+            </a:r>
+            <a:r>
+              <a:rPr lang="en-US" dirty="0" smtClean="0"/>
+              <a:t>ayout</a:t>
+            </a:r>
+          </a:p>
+          <a:p>
+            <a:r>
+              <a:rPr lang="en-US" dirty="0" smtClean="0"/>
+              <a:t>2005 paper establishes framework, Willis, Greenberg &amp; White apply it to scientific data schemas in 2012</a:t>
+            </a:r>
+            <a:endParaRPr lang="en-US" dirty="0"/>
+          </a:p>
+        </p:txBody>
+      </p:sp>
+    </p:spTree>
+    <p:extLst>
+      <p:ext uri="{BB962C8B-B14F-4D97-AF65-F5344CB8AC3E}">
+        <p14:creationId xmlns:p14="http://schemas.microsoft.com/office/powerpoint/2010/main" val="3021850292"/>
+      </p:ext>
+    </p:extLst>
+  </p:cSld>
+  <p:clrMapOvr>
+    <a:masterClrMapping/>
+  </p:clrMapOvr>
+</p:sld>
+</file>
+
+<file path=ppt/slides/slide29.xml><?xml version="1.0" encoding="utf-8"?>
+<p:sld xmlns:a="http://schemas.openxmlformats.org/drawingml/2006/main" xmlns:r="http://schemas.openxmlformats.org/officeDocument/2006/relationships" xmlns:p="http://schemas.openxmlformats.org/presentationml/2006/main">
+  <p:cSld>
+    <p:spTree>
+      <p:nvGrpSpPr>
+        <p:cNvPr id="1" name=""/>
+        <p:cNvGrpSpPr/>
+        <p:nvPr/>
+      </p:nvGrpSpPr>
+      <p:grpSpPr>
+        <a:xfrm>
+          <a:off x="0" y="0"/>
+          <a:ext cx="0" cy="0"/>
+          <a:chOff x="0" y="0"/>
+          <a:chExt cx="0" cy="0"/>
+        </a:xfrm>
+      </p:grpSpPr>
+      <p:sp>
+        <p:nvSpPr>
+          <p:cNvPr id="2" name="Title 1"/>
+          <p:cNvSpPr>
+            <a:spLocks noGrp="1"/>
+          </p:cNvSpPr>
+          <p:nvPr>
+            <p:ph type="title"/>
+          </p:nvPr>
+        </p:nvSpPr>
+        <p:spPr/>
+        <p:txBody>
+          <a:bodyPr/>
+          <a:lstStyle/>
+          <a:p>
+            <a:r>
+              <a:rPr lang="en-US" dirty="0" smtClean="0"/>
+              <a:t>MODAL applied</a:t>
+            </a:r>
+            <a:endParaRPr lang="en-US" dirty="0"/>
+          </a:p>
+        </p:txBody>
+      </p:sp>
+      <p:sp>
+        <p:nvSpPr>
+          <p:cNvPr id="3" name="Content Placeholder 2"/>
+          <p:cNvSpPr>
+            <a:spLocks noGrp="1"/>
+          </p:cNvSpPr>
+          <p:nvPr>
+            <p:ph idx="1"/>
+          </p:nvPr>
+        </p:nvSpPr>
+        <p:spPr/>
+        <p:txBody>
+          <a:bodyPr/>
+          <a:lstStyle/>
+          <a:p>
+            <a:pPr marL="0" indent="0">
+              <a:buNone/>
+            </a:pPr>
+            <a:r>
+              <a:rPr lang="en-US" dirty="0" smtClean="0"/>
+              <a:t>Research questions:</a:t>
+            </a:r>
+          </a:p>
+          <a:p>
+            <a:pPr marL="914400" lvl="1" indent="-514350">
+              <a:buFont typeface="+mj-lt"/>
+              <a:buAutoNum type="arabicPeriod"/>
+            </a:pPr>
+            <a:r>
+              <a:rPr lang="en-US" dirty="0" smtClean="0"/>
+              <a:t>What </a:t>
+            </a:r>
+            <a:r>
+              <a:rPr lang="en-US" dirty="0"/>
+              <a:t>is the scope of scientific metadata schemes? </a:t>
+            </a:r>
+            <a:endParaRPr lang="en-US" dirty="0" smtClean="0"/>
+          </a:p>
+          <a:p>
+            <a:pPr marL="914400" lvl="1" indent="-514350">
+              <a:buFont typeface="+mj-lt"/>
+              <a:buAutoNum type="arabicPeriod"/>
+            </a:pPr>
+            <a:r>
+              <a:rPr lang="en-US" dirty="0" smtClean="0"/>
+              <a:t>What </a:t>
+            </a:r>
+            <a:r>
+              <a:rPr lang="en-US" dirty="0"/>
+              <a:t>are the similarities and differences between </a:t>
+            </a:r>
+            <a:r>
+              <a:rPr lang="en-US" dirty="0" smtClean="0"/>
+              <a:t>scientific </a:t>
+            </a:r>
+            <a:r>
+              <a:rPr lang="en-US" dirty="0"/>
+              <a:t>metadata schemes</a:t>
+            </a:r>
+            <a:r>
+              <a:rPr lang="en-US" dirty="0" smtClean="0"/>
+              <a:t>?</a:t>
+            </a:r>
+          </a:p>
+          <a:p>
+            <a:pPr marL="914400" lvl="1" indent="-514350">
+              <a:buFont typeface="+mj-lt"/>
+              <a:buAutoNum type="arabicPeriod"/>
+            </a:pPr>
+            <a:r>
+              <a:rPr lang="en-US" dirty="0" smtClean="0"/>
+              <a:t>What </a:t>
+            </a:r>
+            <a:r>
+              <a:rPr lang="en-US" dirty="0"/>
+              <a:t>may be the fundamental requirements of metadata schemes for scientific data</a:t>
+            </a:r>
+            <a:r>
+              <a:rPr lang="en-US" dirty="0" smtClean="0"/>
+              <a:t>?</a:t>
+            </a:r>
+            <a:endParaRPr lang="en-US" dirty="0"/>
+          </a:p>
+        </p:txBody>
+      </p:sp>
+    </p:spTree>
+    <p:extLst>
+      <p:ext uri="{BB962C8B-B14F-4D97-AF65-F5344CB8AC3E}">
+        <p14:creationId xmlns:p14="http://schemas.microsoft.com/office/powerpoint/2010/main" val="1282088194"/>
       </p:ext>
     </p:extLst>
   </p:cSld>
@@ -7735,7 +9165,11 @@
           <a:p>
             <a:r>
               <a:rPr lang="en-US" sz="3600" dirty="0" smtClean="0"/>
-              <a:t>And yet… </a:t>
+              <a:t>And </a:t>
+            </a:r>
+            <a:r>
+              <a:rPr lang="en-US" sz="3600" dirty="0" smtClean="0"/>
+              <a:t>yet </a:t>
             </a:r>
             <a:endParaRPr lang="en-US" sz="3600" i="1" dirty="0"/>
           </a:p>
@@ -7790,47 +9224,67 @@
         </p:nvSpPr>
         <p:spPr/>
         <p:txBody>
+          <a:bodyPr>
+            <a:normAutofit fontScale="90000"/>
+          </a:bodyPr>
+          <a:lstStyle/>
+          <a:p>
+            <a:r>
+              <a:rPr lang="en-US" dirty="0" smtClean="0"/>
+              <a:t>Understanding needs before selecting standards</a:t>
+            </a:r>
+            <a:endParaRPr lang="en-US" dirty="0"/>
+          </a:p>
+        </p:txBody>
+      </p:sp>
+      <p:sp>
+        <p:nvSpPr>
+          <p:cNvPr id="3" name="Content Placeholder 2"/>
+          <p:cNvSpPr>
+            <a:spLocks noGrp="1"/>
+          </p:cNvSpPr>
+          <p:nvPr>
+            <p:ph idx="1"/>
+          </p:nvPr>
+        </p:nvSpPr>
+        <p:spPr/>
+        <p:txBody>
           <a:bodyPr/>
           <a:lstStyle/>
           <a:p>
             <a:r>
               <a:rPr lang="en-US" dirty="0" smtClean="0"/>
-              <a:t>But there is hope	</a:t>
-            </a:r>
-            <a:endParaRPr lang="en-US" dirty="0"/>
-          </a:p>
-        </p:txBody>
-      </p:sp>
-      <p:sp>
-        <p:nvSpPr>
-          <p:cNvPr id="3" name="Content Placeholder 2"/>
-          <p:cNvSpPr>
-            <a:spLocks noGrp="1"/>
-          </p:cNvSpPr>
-          <p:nvPr>
-            <p:ph idx="1"/>
-          </p:nvPr>
-        </p:nvSpPr>
-        <p:spPr/>
-        <p:txBody>
-          <a:bodyPr/>
-          <a:lstStyle/>
-          <a:p>
+              <a:t>Before </a:t>
+            </a:r>
+            <a:r>
+              <a:rPr lang="en-US" dirty="0"/>
+              <a:t>looking at schemas, </a:t>
+            </a:r>
             <a:r>
               <a:rPr lang="en-US" dirty="0" smtClean="0"/>
-              <a:t>Clearly articulating your and your users’ needs can help you better clarify what you need out of a schema</a:t>
-            </a:r>
-          </a:p>
-          <a:p>
-            <a:endParaRPr lang="en-US" dirty="0"/>
+              <a:t>articulate the </a:t>
+            </a:r>
+            <a:r>
+              <a:rPr lang="en-US" dirty="0"/>
+              <a:t>specificities of your repository and your users</a:t>
+            </a:r>
+          </a:p>
+          <a:p>
+            <a:endParaRPr lang="en-US" dirty="0" smtClean="0"/>
           </a:p>
           <a:p>
             <a:r>
               <a:rPr lang="en-US" dirty="0" smtClean="0"/>
-              <a:t>And understanding the strengths vs. limitations of a schema will help you decide which to use, or adapt</a:t>
-            </a:r>
-          </a:p>
-          <a:p>
+              <a:t>What are </a:t>
+            </a:r>
+            <a:r>
+              <a:rPr lang="en-US" i="1" dirty="0" smtClean="0"/>
+              <a:t>your</a:t>
+            </a:r>
+            <a:r>
+              <a:rPr lang="en-US" dirty="0" smtClean="0"/>
+              <a:t> needs?  What are the practical constraints of your work?</a:t>
+            </a:r>
             <a:endParaRPr lang="en-US" dirty="0"/>
           </a:p>
         </p:txBody>
@@ -7891,15 +9345,7 @@
           <a:p>
             <a:r>
               <a:rPr lang="en-US" sz="3600" dirty="0" smtClean="0"/>
-              <a:t>Step 1: Evaluate </a:t>
-            </a:r>
-            <a:r>
-              <a:rPr lang="en-US" sz="3600" i="1" dirty="0" smtClean="0"/>
-              <a:t>your</a:t>
-            </a:r>
-            <a:r>
-              <a:rPr lang="en-US" sz="3600" dirty="0" smtClean="0"/>
-              <a:t> needs</a:t>
+              <a:t>“Nine questions”</a:t>
             </a:r>
             <a:endParaRPr lang="en-US" sz="3600" i="1" dirty="0"/>
           </a:p>
@@ -7924,27 +9370,10 @@
           <a:p>
             <a:r>
               <a:rPr lang="en-US" dirty="0" smtClean="0"/>
-              <a:t>Before </a:t>
-            </a:r>
-            <a:r>
-              <a:rPr lang="en-US" dirty="0" smtClean="0"/>
-              <a:t>looking at schemas, </a:t>
-            </a:r>
-            <a:r>
-              <a:rPr lang="en-US" dirty="0" smtClean="0"/>
-              <a:t>concentrate on the specificities of </a:t>
-            </a:r>
-            <a:r>
-              <a:rPr lang="en-US" dirty="0" smtClean="0"/>
-              <a:t>your repository and your users</a:t>
-            </a:r>
-            <a:endParaRPr lang="en-US" dirty="0"/>
-          </a:p>
-          <a:p>
-            <a:r>
-              <a:rPr lang="en-US" dirty="0" smtClean="0"/>
-              <a:t>Marie Kennedy suggests we ask following 9 questions:</a:t>
-            </a:r>
+              <a:t>Some questions to ask (from Kennedy, 2008): </a:t>
+            </a:r>
+          </a:p>
+          <a:p>
             <a:endParaRPr lang="en-US" dirty="0"/>
           </a:p>
           <a:p>
@@ -7965,8 +9394,23 @@
             <a:pPr lvl="1"/>
             <a:r>
               <a:rPr lang="en-US" dirty="0" smtClean="0"/>
-              <a:t>How much time/money do you have?</a:t>
-            </a:r>
+              <a:t>How much time/money do you have</a:t>
+            </a:r>
+            <a:r>
+              <a:rPr lang="en-US" dirty="0" smtClean="0"/>
+              <a:t>?</a:t>
+            </a:r>
+          </a:p>
+          <a:p>
+            <a:pPr lvl="1"/>
+            <a:r>
+              <a:rPr lang="en-US" dirty="0"/>
+              <a:t>How will your collection be accessed?</a:t>
+            </a:r>
+          </a:p>
+          <a:p>
+            <a:pPr lvl="1"/>
+            <a:endParaRPr lang="en-US" dirty="0" smtClean="0"/>
           </a:p>
           <a:p>
             <a:endParaRPr lang="en-US" dirty="0" smtClean="0"/>
@@ -8054,15 +9498,12 @@
           <a:p>
             <a:pPr lvl="1"/>
             <a:r>
+              <a:rPr lang="en-US" dirty="0" smtClean="0"/>
+              <a:t>How </a:t>
+            </a:r>
+            <a:r>
               <a:rPr lang="en-US" dirty="0"/>
-              <a:t>How will your collection be accessed?</a:t>
-            </a:r>
-          </a:p>
-          <a:p>
-            <a:pPr lvl="1"/>
-            <a:r>
-              <a:rPr lang="en-US" dirty="0"/>
-              <a:t>How is your collection related to other collections</a:t>
+              <a:t>is your collection related to other collections</a:t>
             </a:r>
             <a:r>
               <a:rPr lang="en-US" dirty="0" smtClean="0"/>
@@ -8153,87 +9594,89 @@
         </p:nvSpPr>
         <p:spPr/>
         <p:txBody>
-          <a:bodyPr/>
-          <a:lstStyle/>
-          <a:p>
+          <a:bodyPr>
+            <a:noAutofit/>
+          </a:bodyPr>
+          <a:lstStyle/>
+          <a:p>
+            <a:r>
+              <a:rPr lang="en-US" sz="3600" dirty="0" smtClean="0"/>
+              <a:t>Kennedy 2008 continued</a:t>
+            </a:r>
+            <a:endParaRPr lang="en-US" sz="3600" dirty="0"/>
+          </a:p>
+        </p:txBody>
+      </p:sp>
+      <p:sp>
+        <p:nvSpPr>
+          <p:cNvPr id="3" name="Content Placeholder 2"/>
+          <p:cNvSpPr>
+            <a:spLocks noGrp="1"/>
+          </p:cNvSpPr>
+          <p:nvPr>
+            <p:ph idx="1"/>
+          </p:nvPr>
+        </p:nvSpPr>
+        <p:spPr/>
+        <p:txBody>
+          <a:bodyPr>
+            <a:normAutofit/>
+          </a:bodyPr>
+          <a:lstStyle/>
+          <a:p>
+            <a:pPr lvl="1"/>
+            <a:r>
+              <a:rPr lang="en-US" b="1" dirty="0" smtClean="0"/>
+              <a:t>How </a:t>
+            </a:r>
+            <a:r>
+              <a:rPr lang="en-US" b="1" dirty="0"/>
+              <a:t>is your collection related to other collections</a:t>
+            </a:r>
+            <a:r>
+              <a:rPr lang="en-US" b="1" dirty="0" smtClean="0"/>
+              <a:t>?</a:t>
+            </a:r>
+          </a:p>
+          <a:p>
+            <a:pPr lvl="1"/>
             <a:r>
               <a:rPr lang="en-US" dirty="0" smtClean="0"/>
-              <a:t>Step 2: Evaluate Schemas</a:t>
+              <a:t>What </a:t>
+            </a:r>
+            <a:r>
+              <a:rPr lang="en-US" dirty="0"/>
+              <a:t>is the scope of your collection?</a:t>
+            </a:r>
+          </a:p>
+          <a:p>
+            <a:pPr lvl="1"/>
+            <a:r>
+              <a:rPr lang="en-US" b="1" dirty="0" smtClean="0"/>
+              <a:t>Will your metadata be harvested?</a:t>
+            </a:r>
+          </a:p>
+          <a:p>
+            <a:pPr lvl="1"/>
+            <a:r>
+              <a:rPr lang="en-US" b="1" dirty="0" smtClean="0"/>
+              <a:t>Do you want your collection to work with other collections?</a:t>
+            </a:r>
+          </a:p>
+          <a:p>
+            <a:pPr lvl="1"/>
+            <a:r>
+              <a:rPr lang="en-US" dirty="0" smtClean="0"/>
+              <a:t>How much maintenance or quality control do you wish?</a:t>
             </a:r>
             <a:endParaRPr lang="en-US" dirty="0"/>
           </a:p>
         </p:txBody>
       </p:sp>
-      <p:sp>
-        <p:nvSpPr>
-          <p:cNvPr id="3" name="Content Placeholder 2"/>
-          <p:cNvSpPr>
-            <a:spLocks noGrp="1"/>
-          </p:cNvSpPr>
-          <p:nvPr>
-            <p:ph idx="1"/>
-          </p:nvPr>
-        </p:nvSpPr>
-        <p:spPr/>
-        <p:txBody>
-          <a:bodyPr/>
-          <a:lstStyle/>
-          <a:p>
-            <a:r>
-              <a:rPr lang="en-US" dirty="0" smtClean="0"/>
-              <a:t>Returning to our </a:t>
-            </a:r>
-            <a:r>
-              <a:rPr lang="en-US" dirty="0" smtClean="0"/>
-              <a:t>many kinds of </a:t>
-            </a:r>
-            <a:r>
-              <a:rPr lang="en-US" dirty="0" smtClean="0"/>
-              <a:t>metadata</a:t>
-            </a:r>
-          </a:p>
-          <a:p>
-            <a:pPr marL="457200" lvl="1" indent="0">
-              <a:buNone/>
-            </a:pPr>
-            <a:endParaRPr lang="en-US" dirty="0"/>
-          </a:p>
-        </p:txBody>
-      </p:sp>
-      <p:pic>
-        <p:nvPicPr>
-          <p:cNvPr id="4" name="Picture 3" descr="seeingstandards.pdf"/>
-          <p:cNvPicPr>
-            <a:picLocks noChangeAspect="1"/>
-          </p:cNvPicPr>
-          <p:nvPr/>
-        </p:nvPicPr>
-        <p:blipFill>
-          <a:blip r:embed="rId3">
-            <a:extLst>
-              <a:ext uri="{28A0092B-C50C-407E-A947-70E740481C1C}">
-                <a14:useLocalDpi xmlns:a14="http://schemas.microsoft.com/office/drawing/2010/main" val="0"/>
-              </a:ext>
-            </a:extLst>
-          </a:blip>
-          <a:stretch>
-            <a:fillRect/>
-          </a:stretch>
-        </p:blipFill>
-        <p:spPr>
-          <a:xfrm>
-            <a:off x="0" y="2416198"/>
-            <a:ext cx="9144000" cy="3048000"/>
-          </a:xfrm>
-          <a:prstGeom prst="rect">
-            <a:avLst/>
-          </a:prstGeom>
-        </p:spPr>
-      </p:pic>
     </p:spTree>
     <p:extLst>
       <p:ext uri="{BB962C8B-B14F-4D97-AF65-F5344CB8AC3E}">
-        <p14:creationId xmlns:p14="http://schemas.microsoft.com/office/powerpoint/2010/main" val="1228390011"/>
+        <p14:creationId xmlns:p14="http://schemas.microsoft.com/office/powerpoint/2010/main" val="3413669261"/>
       </p:ext>
     </p:extLst>
   </p:cSld>
@@ -8267,61 +9710,68 @@
           <a:chExt cx="0" cy="0"/>
         </a:xfrm>
       </p:grpSpPr>
-      <p:pic>
-        <p:nvPicPr>
-          <p:cNvPr id="4" name="Picture 3" descr="Greenberg2005.tiff"/>
-          <p:cNvPicPr>
-            <a:picLocks noChangeAspect="1"/>
-          </p:cNvPicPr>
-          <p:nvPr/>
-        </p:nvPicPr>
-        <p:blipFill>
-          <a:blip r:embed="rId3">
-            <a:extLst>
-              <a:ext uri="{28A0092B-C50C-407E-A947-70E740481C1C}">
-                <a14:useLocalDpi xmlns:a14="http://schemas.microsoft.com/office/drawing/2010/main" val="0"/>
-              </a:ext>
-            </a:extLst>
-          </a:blip>
-          <a:stretch>
-            <a:fillRect/>
-          </a:stretch>
-        </p:blipFill>
-        <p:spPr>
-          <a:xfrm>
-            <a:off x="282209" y="386278"/>
-            <a:ext cx="8499211" cy="4787814"/>
-          </a:xfrm>
-          <a:prstGeom prst="rect">
-            <a:avLst/>
-          </a:prstGeom>
-        </p:spPr>
-      </p:pic>
-      <p:sp>
-        <p:nvSpPr>
-          <p:cNvPr id="5" name="TextBox 4"/>
-          <p:cNvSpPr txBox="1"/>
-          <p:nvPr/>
-        </p:nvSpPr>
-        <p:spPr>
-          <a:xfrm>
-            <a:off x="5150556" y="5194248"/>
-            <a:ext cx="3499555" cy="379641"/>
-          </a:xfrm>
-          <a:prstGeom prst="rect">
-            <a:avLst/>
-          </a:prstGeom>
-          <a:noFill/>
-        </p:spPr>
-        <p:txBody>
-          <a:bodyPr wrap="square" rtlCol="0">
-            <a:spAutoFit/>
-          </a:bodyPr>
+      <p:sp>
+        <p:nvSpPr>
+          <p:cNvPr id="2" name="Title 1"/>
+          <p:cNvSpPr>
+            <a:spLocks noGrp="1"/>
+          </p:cNvSpPr>
+          <p:nvPr>
+            <p:ph type="title"/>
+          </p:nvPr>
+        </p:nvSpPr>
+        <p:spPr/>
+        <p:txBody>
+          <a:bodyPr/>
           <a:lstStyle/>
           <a:p>
             <a:r>
               <a:rPr lang="en-US" dirty="0" smtClean="0"/>
-              <a:t>From Greenberg, 2005</a:t>
+              <a:t>Community needs</a:t>
+            </a:r>
+            <a:endParaRPr lang="en-US" dirty="0"/>
+          </a:p>
+        </p:txBody>
+      </p:sp>
+      <p:sp>
+        <p:nvSpPr>
+          <p:cNvPr id="3" name="Content Placeholder 2"/>
+          <p:cNvSpPr>
+            <a:spLocks noGrp="1"/>
+          </p:cNvSpPr>
+          <p:nvPr>
+            <p:ph idx="1"/>
+          </p:nvPr>
+        </p:nvSpPr>
+        <p:spPr/>
+        <p:txBody>
+          <a:bodyPr/>
+          <a:lstStyle/>
+          <a:p>
+            <a:r>
+              <a:rPr lang="en-US" dirty="0" smtClean="0"/>
+              <a:t>Remember your Designated Community?</a:t>
+            </a:r>
+          </a:p>
+          <a:p>
+            <a:pPr lvl="1"/>
+            <a:r>
+              <a:rPr lang="en-US" dirty="0" smtClean="0"/>
+              <a:t>What are their needs?</a:t>
+            </a:r>
+          </a:p>
+          <a:p>
+            <a:pPr lvl="1"/>
+            <a:r>
+              <a:rPr lang="en-US" dirty="0" smtClean="0"/>
+              <a:t>What standards do they use?</a:t>
+            </a:r>
+          </a:p>
+          <a:p>
+            <a:pPr lvl="1"/>
+            <a:r>
+              <a:rPr lang="en-US" dirty="0" smtClean="0"/>
+              <a:t>What constraints do they have?</a:t>
             </a:r>
             <a:endParaRPr lang="en-US" dirty="0"/>
           </a:p>
@@ -8330,7 +9780,7 @@
     </p:spTree>
     <p:extLst>
       <p:ext uri="{BB962C8B-B14F-4D97-AF65-F5344CB8AC3E}">
-        <p14:creationId xmlns:p14="http://schemas.microsoft.com/office/powerpoint/2010/main" val="705146296"/>
+        <p14:creationId xmlns:p14="http://schemas.microsoft.com/office/powerpoint/2010/main" val="4043475452"/>
       </p:ext>
     </p:extLst>
   </p:cSld>
@@ -8369,91 +9819,66 @@
         </p:nvSpPr>
         <p:spPr/>
         <p:txBody>
+          <a:bodyPr>
+            <a:normAutofit fontScale="90000"/>
+          </a:bodyPr>
+          <a:lstStyle/>
+          <a:p>
+            <a:r>
+              <a:rPr lang="en-US" dirty="0" smtClean="0"/>
+              <a:t>Some communities have very specific standards and needs </a:t>
+            </a:r>
+            <a:endParaRPr lang="en-US" dirty="0"/>
+          </a:p>
+        </p:txBody>
+      </p:sp>
+      <p:sp>
+        <p:nvSpPr>
+          <p:cNvPr id="3" name="Content Placeholder 2"/>
+          <p:cNvSpPr>
+            <a:spLocks noGrp="1"/>
+          </p:cNvSpPr>
+          <p:nvPr>
+            <p:ph idx="1"/>
+          </p:nvPr>
+        </p:nvSpPr>
+        <p:spPr/>
+        <p:txBody>
           <a:bodyPr/>
           <a:lstStyle/>
           <a:p>
             <a:r>
               <a:rPr lang="en-US" dirty="0" smtClean="0"/>
-              <a:t>The MODAL framework</a:t>
-            </a:r>
-            <a:endParaRPr lang="en-US" dirty="0"/>
-          </a:p>
-        </p:txBody>
-      </p:sp>
-      <p:sp>
-        <p:nvSpPr>
-          <p:cNvPr id="3" name="Content Placeholder 2"/>
-          <p:cNvSpPr>
-            <a:spLocks noGrp="1"/>
-          </p:cNvSpPr>
-          <p:nvPr>
-            <p:ph idx="1"/>
-          </p:nvPr>
-        </p:nvSpPr>
-        <p:spPr/>
-        <p:txBody>
-          <a:bodyPr/>
-          <a:lstStyle/>
-          <a:p>
+              <a:t>For instance:</a:t>
+            </a:r>
+          </a:p>
+          <a:p>
+            <a:pPr lvl="1"/>
             <a:r>
               <a:rPr lang="en-US" dirty="0" smtClean="0"/>
-              <a:t>Developed by Jane Greenberg (Drexel)</a:t>
-            </a:r>
-          </a:p>
-          <a:p>
-            <a:r>
-              <a:rPr lang="en-US" dirty="0"/>
-              <a:t>Conceptual framework for </a:t>
+              <a:t>Biodiversity scientists use </a:t>
+            </a:r>
+            <a:r>
+              <a:rPr lang="en-US" dirty="0" err="1" smtClean="0"/>
+              <a:t>DarwinCore</a:t>
             </a:r>
             <a:r>
               <a:rPr lang="en-US" dirty="0" smtClean="0"/>
-              <a:t>analyzing </a:t>
-            </a:r>
-            <a:r>
-              <a:rPr lang="en-US" b="1" u="sng" dirty="0" smtClean="0"/>
-              <a:t>M</a:t>
-            </a:r>
+              <a:t> records</a:t>
+            </a:r>
+          </a:p>
+          <a:p>
+            <a:pPr lvl="1"/>
             <a:r>
               <a:rPr lang="en-US" dirty="0" smtClean="0"/>
-              <a:t>etadata </a:t>
-            </a:r>
-            <a:r>
-              <a:rPr lang="en-US" b="1" u="sng" dirty="0" smtClean="0"/>
-              <a:t>O</a:t>
-            </a:r>
+              <a:t>GIS data are increasingly rendered in FGDC</a:t>
+            </a:r>
+          </a:p>
+          <a:p>
+            <a:pPr lvl="1"/>
             <a:r>
               <a:rPr lang="en-US" dirty="0" smtClean="0"/>
-              <a:t>bjectives and principles, </a:t>
-            </a:r>
-            <a:r>
-              <a:rPr lang="en-US" b="1" u="sng" dirty="0" smtClean="0"/>
-              <a:t>D</a:t>
-            </a:r>
-            <a:r>
-              <a:rPr lang="en-US" dirty="0" smtClean="0"/>
-              <a:t>omain, and </a:t>
-            </a:r>
-            <a:r>
-              <a:rPr lang="en-US" b="1" u="sng" dirty="0" smtClean="0"/>
-              <a:t>A</a:t>
-            </a:r>
-            <a:r>
-              <a:rPr lang="en-US" dirty="0" smtClean="0"/>
-              <a:t>rchitectural </a:t>
-            </a:r>
-            <a:r>
-              <a:rPr lang="en-US" b="1" u="sng" dirty="0" smtClean="0"/>
-              <a:t>L</a:t>
-            </a:r>
-            <a:r>
-              <a:rPr lang="en-US" dirty="0" smtClean="0"/>
-              <a:t>ayout</a:t>
-            </a:r>
-          </a:p>
-          <a:p>
-            <a:r>
-              <a:rPr lang="en-US" dirty="0" smtClean="0"/>
-              <a:t>2005 paper establishes framework, Willis, Greenberg &amp; White apply it to scientific data schemas in 2012</a:t>
+              <a:t>Something else</a:t>
             </a:r>
             <a:endParaRPr lang="en-US" dirty="0"/>
           </a:p>
@@ -8462,7 +9887,7 @@
     </p:spTree>
     <p:extLst>
       <p:ext uri="{BB962C8B-B14F-4D97-AF65-F5344CB8AC3E}">
-        <p14:creationId xmlns:p14="http://schemas.microsoft.com/office/powerpoint/2010/main" val="3845984081"/>
+        <p14:creationId xmlns:p14="http://schemas.microsoft.com/office/powerpoint/2010/main" val="4265355696"/>
       </p:ext>
     </p:extLst>
   </p:cSld>

</xml_diff>